<commit_message>
Survey Presentation - Gagandeep
</commit_message>
<xml_diff>
--- a/Presentations/Gagandeepsingh_Randhawa_Survey_Presentation.pptx
+++ b/Presentations/Gagandeepsingh_Randhawa_Survey_Presentation.pptx
@@ -6057,7 +6057,17 @@
           <a:bodyPr/>
           <a:lstStyle/>
           <a:p>
-            <a:endParaRPr lang="en-US" dirty="0"/>
+            <a:r>
+              <a:rPr lang="en-US" dirty="0" smtClean="0"/>
+              <a:t>Gagandeep singh Randhawa</a:t>
+            </a:r>
+          </a:p>
+          <a:p>
+            <a:r>
+              <a:rPr lang="en-US" sz="1600" dirty="0" smtClean="0"/>
+              <a:t>CECS 579 Information Security</a:t>
+            </a:r>
+            <a:endParaRPr lang="en-US" sz="1600" dirty="0"/>
           </a:p>
         </p:txBody>
       </p:sp>

</xml_diff>

<commit_message>
Added PJSIP Library and Android Make file
Added PJSIP Library and integration of Openssl for communication with
server. PJSIP works in conjunction with openssl
</commit_message>
<xml_diff>
--- a/Presentations/Gagandeepsingh_Randhawa_Survey_Presentation.pptx
+++ b/Presentations/Gagandeepsingh_Randhawa_Survey_Presentation.pptx
@@ -2,37 +2,36 @@
 <file path=ppt/presentation.xml><?xml version="1.0" encoding="utf-8"?>
 <p:presentation xmlns:a="http://schemas.openxmlformats.org/drawingml/2006/main" xmlns:r="http://schemas.openxmlformats.org/officeDocument/2006/relationships" xmlns:p="http://schemas.openxmlformats.org/presentationml/2006/main" saveSubsetFonts="1">
   <p:sldMasterIdLst>
-    <p:sldMasterId id="2147483678" r:id="rId1"/>
+    <p:sldMasterId id="2147483714" r:id="rId1"/>
   </p:sldMasterIdLst>
   <p:notesMasterIdLst>
-    <p:notesMasterId r:id="rId27"/>
+    <p:notesMasterId r:id="rId26"/>
   </p:notesMasterIdLst>
   <p:sldIdLst>
     <p:sldId id="256" r:id="rId2"/>
     <p:sldId id="257" r:id="rId3"/>
-    <p:sldId id="258" r:id="rId4"/>
-    <p:sldId id="262" r:id="rId5"/>
-    <p:sldId id="263" r:id="rId6"/>
-    <p:sldId id="264" r:id="rId7"/>
-    <p:sldId id="260" r:id="rId8"/>
-    <p:sldId id="268" r:id="rId9"/>
-    <p:sldId id="259" r:id="rId10"/>
-    <p:sldId id="261" r:id="rId11"/>
-    <p:sldId id="267" r:id="rId12"/>
-    <p:sldId id="272" r:id="rId13"/>
-    <p:sldId id="271" r:id="rId14"/>
-    <p:sldId id="269" r:id="rId15"/>
-    <p:sldId id="270" r:id="rId16"/>
-    <p:sldId id="273" r:id="rId17"/>
-    <p:sldId id="274" r:id="rId18"/>
-    <p:sldId id="275" r:id="rId19"/>
-    <p:sldId id="276" r:id="rId20"/>
-    <p:sldId id="277" r:id="rId21"/>
-    <p:sldId id="278" r:id="rId22"/>
-    <p:sldId id="279" r:id="rId23"/>
-    <p:sldId id="280" r:id="rId24"/>
-    <p:sldId id="281" r:id="rId25"/>
-    <p:sldId id="265" r:id="rId26"/>
+    <p:sldId id="262" r:id="rId4"/>
+    <p:sldId id="263" r:id="rId5"/>
+    <p:sldId id="264" r:id="rId6"/>
+    <p:sldId id="260" r:id="rId7"/>
+    <p:sldId id="268" r:id="rId8"/>
+    <p:sldId id="259" r:id="rId9"/>
+    <p:sldId id="261" r:id="rId10"/>
+    <p:sldId id="267" r:id="rId11"/>
+    <p:sldId id="272" r:id="rId12"/>
+    <p:sldId id="271" r:id="rId13"/>
+    <p:sldId id="269" r:id="rId14"/>
+    <p:sldId id="270" r:id="rId15"/>
+    <p:sldId id="273" r:id="rId16"/>
+    <p:sldId id="274" r:id="rId17"/>
+    <p:sldId id="275" r:id="rId18"/>
+    <p:sldId id="276" r:id="rId19"/>
+    <p:sldId id="277" r:id="rId20"/>
+    <p:sldId id="278" r:id="rId21"/>
+    <p:sldId id="279" r:id="rId22"/>
+    <p:sldId id="280" r:id="rId23"/>
+    <p:sldId id="281" r:id="rId24"/>
+    <p:sldId id="265" r:id="rId25"/>
   </p:sldIdLst>
   <p:sldSz cx="12192000" cy="6858000"/>
   <p:notesSz cx="6858000" cy="9144000"/>
@@ -648,7 +647,7 @@
     </p:spTree>
     <p:extLst>
       <p:ext uri="{BB962C8B-B14F-4D97-AF65-F5344CB8AC3E}">
-        <p14:creationId xmlns:p14="http://schemas.microsoft.com/office/powerpoint/2010/main" val="3496376310"/>
+        <p14:creationId xmlns:p14="http://schemas.microsoft.com/office/powerpoint/2010/main" val="1432567919"/>
       </p:ext>
     </p:extLst>
   </p:cSld>
@@ -822,7 +821,7 @@
     </p:spTree>
     <p:extLst>
       <p:ext uri="{BB962C8B-B14F-4D97-AF65-F5344CB8AC3E}">
-        <p14:creationId xmlns:p14="http://schemas.microsoft.com/office/powerpoint/2010/main" val="1432567919"/>
+        <p14:creationId xmlns:p14="http://schemas.microsoft.com/office/powerpoint/2010/main" val="903519256"/>
       </p:ext>
     </p:extLst>
   </p:cSld>
@@ -876,96 +875,6 @@
           <a:bodyPr/>
           <a:lstStyle/>
           <a:p>
-            <a:pPr marL="285750" indent="-285750">
-              <a:buFont typeface="Arial" panose="020B0604020202020204" pitchFamily="34" charset="0"/>
-              <a:buChar char="•"/>
-            </a:pPr>
-            <a:r>
-              <a:rPr lang="en-US" sz="1200" dirty="0" smtClean="0"/>
-              <a:t>Recent password breaches</a:t>
-            </a:r>
-          </a:p>
-          <a:p>
-            <a:pPr marL="342900" indent="-342900">
-              <a:buAutoNum type="arabicPeriod"/>
-            </a:pPr>
-            <a:r>
-              <a:rPr lang="en-US" sz="1200" dirty="0" smtClean="0"/>
-              <a:t>Yahoo, January 2014, 273Mn[1]</a:t>
-            </a:r>
-          </a:p>
-          <a:p>
-            <a:pPr marL="342900" indent="-342900">
-              <a:buAutoNum type="arabicPeriod"/>
-            </a:pPr>
-            <a:r>
-              <a:rPr lang="en-US" sz="1200" dirty="0" smtClean="0"/>
-              <a:t>Evernote, March 2013, 50Mn. </a:t>
-            </a:r>
-          </a:p>
-          <a:p>
-            <a:pPr marL="342900" indent="-342900">
-              <a:buAutoNum type="arabicPeriod"/>
-            </a:pPr>
-            <a:r>
-              <a:rPr lang="en-US" sz="1200" dirty="0" smtClean="0"/>
-              <a:t>LinkedIn June 2012, 6+Mn.</a:t>
-            </a:r>
-          </a:p>
-          <a:p>
-            <a:r>
-              <a:rPr lang="en-US" sz="1200" dirty="0" smtClean="0"/>
-              <a:t>And More…</a:t>
-            </a:r>
-          </a:p>
-          <a:p>
-            <a:pPr marL="285750" indent="-285750">
-              <a:buFont typeface="Arial" panose="020B0604020202020204" pitchFamily="34" charset="0"/>
-              <a:buChar char="•"/>
-            </a:pPr>
-            <a:r>
-              <a:rPr lang="en-US" sz="1200" dirty="0" smtClean="0"/>
-              <a:t>Facts</a:t>
-            </a:r>
-          </a:p>
-          <a:p>
-            <a:r>
-              <a:rPr lang="en-US" sz="1200" dirty="0" smtClean="0"/>
-              <a:t>Based on PKCS Standards</a:t>
-            </a:r>
-          </a:p>
-          <a:p>
-            <a:r>
-              <a:rPr lang="en-US" sz="1200" dirty="0" smtClean="0"/>
-              <a:t>Approx. 1% Passwords were same</a:t>
-            </a:r>
-          </a:p>
-          <a:p>
-            <a:r>
-              <a:rPr lang="en-US" sz="1200" dirty="0" smtClean="0"/>
-              <a:t>Average Entropy </a:t>
-            </a:r>
-            <a:r>
-              <a:rPr lang="el-GR" sz="1200" b="1" dirty="0" smtClean="0"/>
-              <a:t>μ</a:t>
-            </a:r>
-            <a:r>
-              <a:rPr lang="en-US" sz="1200" b="1" dirty="0" smtClean="0"/>
-              <a:t> &lt; 7</a:t>
-            </a:r>
-            <a:endParaRPr lang="en-US" sz="1200" dirty="0" smtClean="0"/>
-          </a:p>
-          <a:p>
-            <a:endParaRPr lang="en-US" sz="800" dirty="0" smtClean="0"/>
-          </a:p>
-          <a:p>
-            <a:pPr algn="l"/>
-            <a:r>
-              <a:rPr lang="en-US" sz="800" dirty="0" smtClean="0"/>
-              <a:t>Source: Yahoo News</a:t>
-            </a:r>
-          </a:p>
-          <a:p>
             <a:endParaRPr lang="en-US" dirty="0"/>
           </a:p>
         </p:txBody>
@@ -987,7 +896,7 @@
           <a:p>
             <a:fld id="{C62BDAD2-A6EB-4D78-BC57-1B90255DFB2A}" type="slidenum">
               <a:rPr lang="en-US" smtClean="0"/>
-              <a:t>5</a:t>
+              <a:t>6</a:t>
             </a:fld>
             <a:endParaRPr lang="en-US"/>
           </a:p>
@@ -996,7 +905,7 @@
     </p:spTree>
     <p:extLst>
       <p:ext uri="{BB962C8B-B14F-4D97-AF65-F5344CB8AC3E}">
-        <p14:creationId xmlns:p14="http://schemas.microsoft.com/office/powerpoint/2010/main" val="903519256"/>
+        <p14:creationId xmlns:p14="http://schemas.microsoft.com/office/powerpoint/2010/main" val="895851031"/>
       </p:ext>
     </p:extLst>
   </p:cSld>
@@ -1050,6 +959,12 @@
           <a:bodyPr/>
           <a:lstStyle/>
           <a:p>
+            <a:r>
+              <a:rPr lang="en-US" dirty="0" smtClean="0"/>
+              <a:t>Conventional PKCS#5 style encryption. No padding, redundancy</a:t>
+            </a:r>
+          </a:p>
+          <a:p>
             <a:endParaRPr lang="en-US" dirty="0"/>
           </a:p>
         </p:txBody>
@@ -1071,7 +986,7 @@
           <a:p>
             <a:fld id="{C62BDAD2-A6EB-4D78-BC57-1B90255DFB2A}" type="slidenum">
               <a:rPr lang="en-US" smtClean="0"/>
-              <a:t>7</a:t>
+              <a:t>11</a:t>
             </a:fld>
             <a:endParaRPr lang="en-US"/>
           </a:p>
@@ -1080,7 +995,7 @@
     </p:spTree>
     <p:extLst>
       <p:ext uri="{BB962C8B-B14F-4D97-AF65-F5344CB8AC3E}">
-        <p14:creationId xmlns:p14="http://schemas.microsoft.com/office/powerpoint/2010/main" val="895851031"/>
+        <p14:creationId xmlns:p14="http://schemas.microsoft.com/office/powerpoint/2010/main" val="1413560058"/>
       </p:ext>
     </p:extLst>
   </p:cSld>
@@ -1134,12 +1049,6 @@
           <a:bodyPr/>
           <a:lstStyle/>
           <a:p>
-            <a:r>
-              <a:rPr lang="en-US" dirty="0" smtClean="0"/>
-              <a:t>Conventional PKCS#5 style encryption. No padding, redundancy</a:t>
-            </a:r>
-          </a:p>
-          <a:p>
             <a:endParaRPr lang="en-US" dirty="0"/>
           </a:p>
         </p:txBody>
@@ -1161,7 +1070,7 @@
           <a:p>
             <a:fld id="{C62BDAD2-A6EB-4D78-BC57-1B90255DFB2A}" type="slidenum">
               <a:rPr lang="en-US" smtClean="0"/>
-              <a:t>12</a:t>
+              <a:t>14</a:t>
             </a:fld>
             <a:endParaRPr lang="en-US"/>
           </a:p>
@@ -1170,7 +1079,7 @@
     </p:spTree>
     <p:extLst>
       <p:ext uri="{BB962C8B-B14F-4D97-AF65-F5344CB8AC3E}">
-        <p14:creationId xmlns:p14="http://schemas.microsoft.com/office/powerpoint/2010/main" val="1413560058"/>
+        <p14:creationId xmlns:p14="http://schemas.microsoft.com/office/powerpoint/2010/main" val="3805193584"/>
       </p:ext>
     </p:extLst>
   </p:cSld>
@@ -1224,6 +1133,46 @@
           <a:bodyPr/>
           <a:lstStyle/>
           <a:p>
+            <a:r>
+              <a:rPr lang="en-US" dirty="0" err="1" smtClean="0"/>
+              <a:t>Pr</a:t>
+            </a:r>
+            <a:r>
+              <a:rPr lang="en-US" dirty="0" smtClean="0"/>
+              <a:t>[</a:t>
+            </a:r>
+            <a:r>
+              <a:rPr lang="en-US" dirty="0" err="1" smtClean="0"/>
+              <a:t>HDecK</a:t>
+            </a:r>
+            <a:r>
+              <a:rPr lang="en-US" dirty="0" smtClean="0"/>
+              <a:t>(</a:t>
+            </a:r>
+            <a:r>
+              <a:rPr lang="en-US" dirty="0" err="1" smtClean="0"/>
+              <a:t>HEncK</a:t>
+            </a:r>
+            <a:r>
+              <a:rPr lang="en-US" dirty="0" smtClean="0"/>
+              <a:t>(M)) = M] = 1 for all K ∈</a:t>
+            </a:r>
+            <a:r>
+              <a:rPr lang="en-US" dirty="0" err="1" smtClean="0"/>
+              <a:t>Kand</a:t>
+            </a:r>
+            <a:r>
+              <a:rPr lang="en-US" dirty="0" smtClean="0"/>
+              <a:t> M ∈M, where the event is deﬁned over the randomness in </a:t>
+            </a:r>
+            <a:r>
+              <a:rPr lang="en-US" dirty="0" err="1" smtClean="0"/>
+              <a:t>HEnc</a:t>
+            </a:r>
+            <a:r>
+              <a:rPr lang="en-US" dirty="0" smtClean="0"/>
+              <a:t>. </a:t>
+            </a:r>
             <a:endParaRPr lang="en-US" dirty="0"/>
           </a:p>
         </p:txBody>
@@ -1245,7 +1194,7 @@
           <a:p>
             <a:fld id="{C62BDAD2-A6EB-4D78-BC57-1B90255DFB2A}" type="slidenum">
               <a:rPr lang="en-US" smtClean="0"/>
-              <a:t>15</a:t>
+              <a:t>16</a:t>
             </a:fld>
             <a:endParaRPr lang="en-US"/>
           </a:p>
@@ -1254,7 +1203,7 @@
     </p:spTree>
     <p:extLst>
       <p:ext uri="{BB962C8B-B14F-4D97-AF65-F5344CB8AC3E}">
-        <p14:creationId xmlns:p14="http://schemas.microsoft.com/office/powerpoint/2010/main" val="3805193584"/>
+        <p14:creationId xmlns:p14="http://schemas.microsoft.com/office/powerpoint/2010/main" val="1454378885"/>
       </p:ext>
     </p:extLst>
   </p:cSld>
@@ -1308,46 +1257,6 @@
           <a:bodyPr/>
           <a:lstStyle/>
           <a:p>
-            <a:r>
-              <a:rPr lang="en-US" dirty="0" err="1" smtClean="0"/>
-              <a:t>Pr</a:t>
-            </a:r>
-            <a:r>
-              <a:rPr lang="en-US" dirty="0" smtClean="0"/>
-              <a:t>[</a:t>
-            </a:r>
-            <a:r>
-              <a:rPr lang="en-US" dirty="0" err="1" smtClean="0"/>
-              <a:t>HDecK</a:t>
-            </a:r>
-            <a:r>
-              <a:rPr lang="en-US" dirty="0" smtClean="0"/>
-              <a:t>(</a:t>
-            </a:r>
-            <a:r>
-              <a:rPr lang="en-US" dirty="0" err="1" smtClean="0"/>
-              <a:t>HEncK</a:t>
-            </a:r>
-            <a:r>
-              <a:rPr lang="en-US" dirty="0" smtClean="0"/>
-              <a:t>(M)) = M] = 1 for all K ∈</a:t>
-            </a:r>
-            <a:r>
-              <a:rPr lang="en-US" dirty="0" err="1" smtClean="0"/>
-              <a:t>Kand</a:t>
-            </a:r>
-            <a:r>
-              <a:rPr lang="en-US" dirty="0" smtClean="0"/>
-              <a:t> M ∈M, where the event is deﬁned over the randomness in </a:t>
-            </a:r>
-            <a:r>
-              <a:rPr lang="en-US" dirty="0" err="1" smtClean="0"/>
-              <a:t>HEnc</a:t>
-            </a:r>
-            <a:r>
-              <a:rPr lang="en-US" dirty="0" smtClean="0"/>
-              <a:t>. </a:t>
-            </a:r>
             <a:endParaRPr lang="en-US" dirty="0"/>
           </a:p>
         </p:txBody>
@@ -1369,7 +1278,7 @@
           <a:p>
             <a:fld id="{C62BDAD2-A6EB-4D78-BC57-1B90255DFB2A}" type="slidenum">
               <a:rPr lang="en-US" smtClean="0"/>
-              <a:t>17</a:t>
+              <a:t>20</a:t>
             </a:fld>
             <a:endParaRPr lang="en-US"/>
           </a:p>
@@ -1378,7 +1287,7 @@
     </p:spTree>
     <p:extLst>
       <p:ext uri="{BB962C8B-B14F-4D97-AF65-F5344CB8AC3E}">
-        <p14:creationId xmlns:p14="http://schemas.microsoft.com/office/powerpoint/2010/main" val="1454378885"/>
+        <p14:creationId xmlns:p14="http://schemas.microsoft.com/office/powerpoint/2010/main" val="3255522382"/>
       </p:ext>
     </p:extLst>
   </p:cSld>
@@ -1454,90 +1363,6 @@
             <a:fld id="{C62BDAD2-A6EB-4D78-BC57-1B90255DFB2A}" type="slidenum">
               <a:rPr lang="en-US" smtClean="0"/>
               <a:t>21</a:t>
-            </a:fld>
-            <a:endParaRPr lang="en-US"/>
-          </a:p>
-        </p:txBody>
-      </p:sp>
-    </p:spTree>
-    <p:extLst>
-      <p:ext uri="{BB962C8B-B14F-4D97-AF65-F5344CB8AC3E}">
-        <p14:creationId xmlns:p14="http://schemas.microsoft.com/office/powerpoint/2010/main" val="3255522382"/>
-      </p:ext>
-    </p:extLst>
-  </p:cSld>
-  <p:clrMapOvr>
-    <a:masterClrMapping/>
-  </p:clrMapOvr>
-</p:notes>
-</file>
-
-<file path=ppt/notesSlides/notesSlide9.xml><?xml version="1.0" encoding="utf-8"?>
-<p:notes xmlns:a="http://schemas.openxmlformats.org/drawingml/2006/main" xmlns:r="http://schemas.openxmlformats.org/officeDocument/2006/relationships" xmlns:p="http://schemas.openxmlformats.org/presentationml/2006/main">
-  <p:cSld>
-    <p:spTree>
-      <p:nvGrpSpPr>
-        <p:cNvPr id="1" name=""/>
-        <p:cNvGrpSpPr/>
-        <p:nvPr/>
-      </p:nvGrpSpPr>
-      <p:grpSpPr>
-        <a:xfrm>
-          <a:off x="0" y="0"/>
-          <a:ext cx="0" cy="0"/>
-          <a:chOff x="0" y="0"/>
-          <a:chExt cx="0" cy="0"/>
-        </a:xfrm>
-      </p:grpSpPr>
-      <p:sp>
-        <p:nvSpPr>
-          <p:cNvPr id="2" name="Slide Image Placeholder 1"/>
-          <p:cNvSpPr>
-            <a:spLocks noGrp="1" noRot="1" noChangeAspect="1"/>
-          </p:cNvSpPr>
-          <p:nvPr>
-            <p:ph type="sldImg"/>
-          </p:nvPr>
-        </p:nvSpPr>
-        <p:spPr/>
-      </p:sp>
-      <p:sp>
-        <p:nvSpPr>
-          <p:cNvPr id="3" name="Notes Placeholder 2"/>
-          <p:cNvSpPr>
-            <a:spLocks noGrp="1"/>
-          </p:cNvSpPr>
-          <p:nvPr>
-            <p:ph type="body" idx="1"/>
-          </p:nvPr>
-        </p:nvSpPr>
-        <p:spPr/>
-        <p:txBody>
-          <a:bodyPr/>
-          <a:lstStyle/>
-          <a:p>
-            <a:endParaRPr lang="en-US" dirty="0"/>
-          </a:p>
-        </p:txBody>
-      </p:sp>
-      <p:sp>
-        <p:nvSpPr>
-          <p:cNvPr id="4" name="Slide Number Placeholder 3"/>
-          <p:cNvSpPr>
-            <a:spLocks noGrp="1"/>
-          </p:cNvSpPr>
-          <p:nvPr>
-            <p:ph type="sldNum" sz="quarter" idx="10"/>
-          </p:nvPr>
-        </p:nvSpPr>
-        <p:spPr/>
-        <p:txBody>
-          <a:bodyPr/>
-          <a:lstStyle/>
-          <a:p>
-            <a:fld id="{C62BDAD2-A6EB-4D78-BC57-1B90255DFB2A}" type="slidenum">
-              <a:rPr lang="en-US" smtClean="0"/>
-              <a:t>22</a:t>
             </a:fld>
             <a:endParaRPr lang="en-US"/>
           </a:p>
@@ -1790,7 +1615,7 @@
     </p:spTree>
     <p:extLst>
       <p:ext uri="{BB962C8B-B14F-4D97-AF65-F5344CB8AC3E}">
-        <p14:creationId xmlns:p14="http://schemas.microsoft.com/office/powerpoint/2010/main" val="362294400"/>
+        <p14:creationId xmlns:p14="http://schemas.microsoft.com/office/powerpoint/2010/main" val="2307829056"/>
       </p:ext>
     </p:extLst>
   </p:cSld>
@@ -2065,7 +1890,7 @@
     </p:spTree>
     <p:extLst>
       <p:ext uri="{BB962C8B-B14F-4D97-AF65-F5344CB8AC3E}">
-        <p14:creationId xmlns:p14="http://schemas.microsoft.com/office/powerpoint/2010/main" val="1571525616"/>
+        <p14:creationId xmlns:p14="http://schemas.microsoft.com/office/powerpoint/2010/main" val="3638697589"/>
       </p:ext>
     </p:extLst>
   </p:cSld>
@@ -2259,7 +2084,7 @@
     </p:spTree>
     <p:extLst>
       <p:ext uri="{BB962C8B-B14F-4D97-AF65-F5344CB8AC3E}">
-        <p14:creationId xmlns:p14="http://schemas.microsoft.com/office/powerpoint/2010/main" val="3129303169"/>
+        <p14:creationId xmlns:p14="http://schemas.microsoft.com/office/powerpoint/2010/main" val="227487724"/>
       </p:ext>
     </p:extLst>
   </p:cSld>
@@ -2615,7 +2440,7 @@
     </p:spTree>
     <p:extLst>
       <p:ext uri="{BB962C8B-B14F-4D97-AF65-F5344CB8AC3E}">
-        <p14:creationId xmlns:p14="http://schemas.microsoft.com/office/powerpoint/2010/main" val="4067443116"/>
+        <p14:creationId xmlns:p14="http://schemas.microsoft.com/office/powerpoint/2010/main" val="917695771"/>
       </p:ext>
     </p:extLst>
   </p:cSld>
@@ -2859,7 +2684,7 @@
     </p:spTree>
     <p:extLst>
       <p:ext uri="{BB962C8B-B14F-4D97-AF65-F5344CB8AC3E}">
-        <p14:creationId xmlns:p14="http://schemas.microsoft.com/office/powerpoint/2010/main" val="206941192"/>
+        <p14:creationId xmlns:p14="http://schemas.microsoft.com/office/powerpoint/2010/main" val="2734906536"/>
       </p:ext>
     </p:extLst>
   </p:cSld>
@@ -3469,7 +3294,7 @@
     </p:spTree>
     <p:extLst>
       <p:ext uri="{BB962C8B-B14F-4D97-AF65-F5344CB8AC3E}">
-        <p14:creationId xmlns:p14="http://schemas.microsoft.com/office/powerpoint/2010/main" val="3022958801"/>
+        <p14:creationId xmlns:p14="http://schemas.microsoft.com/office/powerpoint/2010/main" val="3891962897"/>
       </p:ext>
     </p:extLst>
   </p:cSld>
@@ -4316,7 +4141,7 @@
     </p:spTree>
     <p:extLst>
       <p:ext uri="{BB962C8B-B14F-4D97-AF65-F5344CB8AC3E}">
-        <p14:creationId xmlns:p14="http://schemas.microsoft.com/office/powerpoint/2010/main" val="4070737576"/>
+        <p14:creationId xmlns:p14="http://schemas.microsoft.com/office/powerpoint/2010/main" val="1297510523"/>
       </p:ext>
     </p:extLst>
   </p:cSld>
@@ -4486,7 +4311,7 @@
     </p:spTree>
     <p:extLst>
       <p:ext uri="{BB962C8B-B14F-4D97-AF65-F5344CB8AC3E}">
-        <p14:creationId xmlns:p14="http://schemas.microsoft.com/office/powerpoint/2010/main" val="1817387927"/>
+        <p14:creationId xmlns:p14="http://schemas.microsoft.com/office/powerpoint/2010/main" val="2051135185"/>
       </p:ext>
     </p:extLst>
   </p:cSld>
@@ -4666,7 +4491,7 @@
     </p:spTree>
     <p:extLst>
       <p:ext uri="{BB962C8B-B14F-4D97-AF65-F5344CB8AC3E}">
-        <p14:creationId xmlns:p14="http://schemas.microsoft.com/office/powerpoint/2010/main" val="1714326977"/>
+        <p14:creationId xmlns:p14="http://schemas.microsoft.com/office/powerpoint/2010/main" val="236650748"/>
       </p:ext>
     </p:extLst>
   </p:cSld>
@@ -4836,7 +4661,7 @@
     </p:spTree>
     <p:extLst>
       <p:ext uri="{BB962C8B-B14F-4D97-AF65-F5344CB8AC3E}">
-        <p14:creationId xmlns:p14="http://schemas.microsoft.com/office/powerpoint/2010/main" val="4083063621"/>
+        <p14:creationId xmlns:p14="http://schemas.microsoft.com/office/powerpoint/2010/main" val="1770714002"/>
       </p:ext>
     </p:extLst>
   </p:cSld>
@@ -5080,7 +4905,7 @@
     </p:spTree>
     <p:extLst>
       <p:ext uri="{BB962C8B-B14F-4D97-AF65-F5344CB8AC3E}">
-        <p14:creationId xmlns:p14="http://schemas.microsoft.com/office/powerpoint/2010/main" val="739116786"/>
+        <p14:creationId xmlns:p14="http://schemas.microsoft.com/office/powerpoint/2010/main" val="2875172568"/>
       </p:ext>
     </p:extLst>
   </p:cSld>
@@ -5372,7 +5197,7 @@
     </p:spTree>
     <p:extLst>
       <p:ext uri="{BB962C8B-B14F-4D97-AF65-F5344CB8AC3E}">
-        <p14:creationId xmlns:p14="http://schemas.microsoft.com/office/powerpoint/2010/main" val="4276277014"/>
+        <p14:creationId xmlns:p14="http://schemas.microsoft.com/office/powerpoint/2010/main" val="1612365266"/>
       </p:ext>
     </p:extLst>
   </p:cSld>
@@ -5810,7 +5635,7 @@
     </p:spTree>
     <p:extLst>
       <p:ext uri="{BB962C8B-B14F-4D97-AF65-F5344CB8AC3E}">
-        <p14:creationId xmlns:p14="http://schemas.microsoft.com/office/powerpoint/2010/main" val="4084682199"/>
+        <p14:creationId xmlns:p14="http://schemas.microsoft.com/office/powerpoint/2010/main" val="1869781883"/>
       </p:ext>
     </p:extLst>
   </p:cSld>
@@ -5928,7 +5753,7 @@
     </p:spTree>
     <p:extLst>
       <p:ext uri="{BB962C8B-B14F-4D97-AF65-F5344CB8AC3E}">
-        <p14:creationId xmlns:p14="http://schemas.microsoft.com/office/powerpoint/2010/main" val="2988729612"/>
+        <p14:creationId xmlns:p14="http://schemas.microsoft.com/office/powerpoint/2010/main" val="3938191382"/>
       </p:ext>
     </p:extLst>
   </p:cSld>
@@ -6023,7 +5848,7 @@
     </p:spTree>
     <p:extLst>
       <p:ext uri="{BB962C8B-B14F-4D97-AF65-F5344CB8AC3E}">
-        <p14:creationId xmlns:p14="http://schemas.microsoft.com/office/powerpoint/2010/main" val="534552047"/>
+        <p14:creationId xmlns:p14="http://schemas.microsoft.com/office/powerpoint/2010/main" val="3010311882"/>
       </p:ext>
     </p:extLst>
   </p:cSld>
@@ -6302,7 +6127,7 @@
     </p:spTree>
     <p:extLst>
       <p:ext uri="{BB962C8B-B14F-4D97-AF65-F5344CB8AC3E}">
-        <p14:creationId xmlns:p14="http://schemas.microsoft.com/office/powerpoint/2010/main" val="830525131"/>
+        <p14:creationId xmlns:p14="http://schemas.microsoft.com/office/powerpoint/2010/main" val="2903565077"/>
       </p:ext>
     </p:extLst>
   </p:cSld>
@@ -6577,7 +6402,7 @@
     </p:spTree>
     <p:extLst>
       <p:ext uri="{BB962C8B-B14F-4D97-AF65-F5344CB8AC3E}">
-        <p14:creationId xmlns:p14="http://schemas.microsoft.com/office/powerpoint/2010/main" val="2656311689"/>
+        <p14:creationId xmlns:p14="http://schemas.microsoft.com/office/powerpoint/2010/main" val="2423511937"/>
       </p:ext>
     </p:extLst>
   </p:cSld>
@@ -7043,29 +6868,29 @@
     </p:spTree>
     <p:extLst>
       <p:ext uri="{BB962C8B-B14F-4D97-AF65-F5344CB8AC3E}">
-        <p14:creationId xmlns:p14="http://schemas.microsoft.com/office/powerpoint/2010/main" val="2650676590"/>
+        <p14:creationId xmlns:p14="http://schemas.microsoft.com/office/powerpoint/2010/main" val="566447042"/>
       </p:ext>
     </p:extLst>
   </p:cSld>
   <p:clrMap bg1="dk1" tx1="lt1" bg2="dk2" tx2="lt2" accent1="accent1" accent2="accent2" accent3="accent3" accent4="accent4" accent5="accent5" accent6="accent6" hlink="hlink" folHlink="folHlink"/>
   <p:sldLayoutIdLst>
-    <p:sldLayoutId id="2147483679" r:id="rId1"/>
-    <p:sldLayoutId id="2147483680" r:id="rId2"/>
-    <p:sldLayoutId id="2147483681" r:id="rId3"/>
-    <p:sldLayoutId id="2147483682" r:id="rId4"/>
-    <p:sldLayoutId id="2147483683" r:id="rId5"/>
-    <p:sldLayoutId id="2147483684" r:id="rId6"/>
-    <p:sldLayoutId id="2147483685" r:id="rId7"/>
-    <p:sldLayoutId id="2147483686" r:id="rId8"/>
-    <p:sldLayoutId id="2147483687" r:id="rId9"/>
-    <p:sldLayoutId id="2147483688" r:id="rId10"/>
-    <p:sldLayoutId id="2147483689" r:id="rId11"/>
-    <p:sldLayoutId id="2147483690" r:id="rId12"/>
-    <p:sldLayoutId id="2147483691" r:id="rId13"/>
-    <p:sldLayoutId id="2147483692" r:id="rId14"/>
-    <p:sldLayoutId id="2147483693" r:id="rId15"/>
-    <p:sldLayoutId id="2147483694" r:id="rId16"/>
-    <p:sldLayoutId id="2147483695" r:id="rId17"/>
+    <p:sldLayoutId id="2147483715" r:id="rId1"/>
+    <p:sldLayoutId id="2147483716" r:id="rId2"/>
+    <p:sldLayoutId id="2147483717" r:id="rId3"/>
+    <p:sldLayoutId id="2147483718" r:id="rId4"/>
+    <p:sldLayoutId id="2147483719" r:id="rId5"/>
+    <p:sldLayoutId id="2147483720" r:id="rId6"/>
+    <p:sldLayoutId id="2147483721" r:id="rId7"/>
+    <p:sldLayoutId id="2147483722" r:id="rId8"/>
+    <p:sldLayoutId id="2147483723" r:id="rId9"/>
+    <p:sldLayoutId id="2147483724" r:id="rId10"/>
+    <p:sldLayoutId id="2147483725" r:id="rId11"/>
+    <p:sldLayoutId id="2147483726" r:id="rId12"/>
+    <p:sldLayoutId id="2147483727" r:id="rId13"/>
+    <p:sldLayoutId id="2147483728" r:id="rId14"/>
+    <p:sldLayoutId id="2147483729" r:id="rId15"/>
+    <p:sldLayoutId id="2147483730" r:id="rId16"/>
+    <p:sldLayoutId id="2147483731" r:id="rId17"/>
   </p:sldLayoutIdLst>
   <p:txStyles>
     <p:titleStyle>
@@ -7530,546 +7355,6 @@
   <p:clrMapOvr>
     <a:masterClrMapping/>
   </p:clrMapOvr>
-</p:sld>
-</file>
-
-<file path=ppt/slides/slide10.xml><?xml version="1.0" encoding="utf-8"?>
-<p:sld xmlns:a="http://schemas.openxmlformats.org/drawingml/2006/main" xmlns:r="http://schemas.openxmlformats.org/officeDocument/2006/relationships" xmlns:p="http://schemas.openxmlformats.org/presentationml/2006/main">
-  <p:cSld>
-    <p:spTree>
-      <p:nvGrpSpPr>
-        <p:cNvPr id="1" name=""/>
-        <p:cNvGrpSpPr/>
-        <p:nvPr/>
-      </p:nvGrpSpPr>
-      <p:grpSpPr>
-        <a:xfrm>
-          <a:off x="0" y="0"/>
-          <a:ext cx="0" cy="0"/>
-          <a:chOff x="0" y="0"/>
-          <a:chExt cx="0" cy="0"/>
-        </a:xfrm>
-      </p:grpSpPr>
-      <p:sp>
-        <p:nvSpPr>
-          <p:cNvPr id="2" name="Title 1"/>
-          <p:cNvSpPr>
-            <a:spLocks noGrp="1"/>
-          </p:cNvSpPr>
-          <p:nvPr>
-            <p:ph type="title"/>
-          </p:nvPr>
-        </p:nvSpPr>
-        <p:spPr/>
-        <p:txBody>
-          <a:bodyPr/>
-          <a:lstStyle/>
-          <a:p>
-            <a:r>
-              <a:rPr lang="en-US" sz="3200" dirty="0"/>
-              <a:t>Password Based </a:t>
-            </a:r>
-            <a:r>
-              <a:rPr lang="en-US" sz="3200" dirty="0" smtClean="0"/>
-              <a:t>Encryption | </a:t>
-            </a:r>
-            <a:r>
-              <a:rPr lang="en-US" sz="2000" dirty="0" smtClean="0"/>
-              <a:t>Example</a:t>
-            </a:r>
-            <a:endParaRPr lang="en-US" sz="3200" dirty="0"/>
-          </a:p>
-        </p:txBody>
-      </p:sp>
-      <p:sp>
-        <p:nvSpPr>
-          <p:cNvPr id="3" name="Content Placeholder 2"/>
-          <p:cNvSpPr>
-            <a:spLocks noGrp="1"/>
-          </p:cNvSpPr>
-          <p:nvPr>
-            <p:ph idx="1"/>
-          </p:nvPr>
-        </p:nvSpPr>
-        <p:spPr>
-          <a:xfrm>
-            <a:off x="1103312" y="1406284"/>
-            <a:ext cx="8946541" cy="4496326"/>
-          </a:xfrm>
-        </p:spPr>
-        <p:txBody>
-          <a:bodyPr>
-            <a:normAutofit/>
-          </a:bodyPr>
-          <a:lstStyle/>
-          <a:p>
-            <a:r>
-              <a:rPr lang="en-US" dirty="0" smtClean="0"/>
-              <a:t>Password Manager</a:t>
-            </a:r>
-          </a:p>
-          <a:p>
-            <a:endParaRPr lang="en-US" dirty="0"/>
-          </a:p>
-          <a:p>
-            <a:pPr lvl="1"/>
-            <a:r>
-              <a:rPr lang="en-US" dirty="0" err="1" smtClean="0"/>
-              <a:t>Lastpass</a:t>
-            </a:r>
-            <a:endParaRPr lang="en-US" dirty="0" smtClean="0"/>
-          </a:p>
-          <a:p>
-            <a:pPr lvl="1"/>
-            <a:r>
-              <a:rPr lang="en-US" dirty="0" err="1" smtClean="0"/>
-              <a:t>Dashlane</a:t>
-            </a:r>
-            <a:endParaRPr lang="en-US" dirty="0" smtClean="0"/>
-          </a:p>
-          <a:p>
-            <a:pPr lvl="1"/>
-            <a:r>
-              <a:rPr lang="en-US" dirty="0" smtClean="0"/>
-              <a:t>More…</a:t>
-            </a:r>
-          </a:p>
-          <a:p>
-            <a:pPr lvl="1"/>
-            <a:endParaRPr lang="en-US" dirty="0"/>
-          </a:p>
-          <a:p>
-            <a:r>
-              <a:rPr lang="en-US" dirty="0" smtClean="0"/>
-              <a:t>User choose Master Password even worse</a:t>
-            </a:r>
-          </a:p>
-          <a:p>
-            <a:r>
-              <a:rPr lang="en-US" dirty="0" smtClean="0"/>
-              <a:t>Vaults are stored in cloud… </a:t>
-            </a:r>
-          </a:p>
-          <a:p>
-            <a:r>
-              <a:rPr lang="en-US" dirty="0" smtClean="0"/>
-              <a:t>There’s already been a breach on</a:t>
-            </a:r>
-            <a:br>
-              <a:rPr lang="en-US" dirty="0" smtClean="0"/>
-            </a:br>
-            <a:r>
-              <a:rPr lang="en-US" dirty="0" err="1" smtClean="0"/>
-              <a:t>Lastpass</a:t>
-            </a:r>
-            <a:r>
-              <a:rPr lang="en-US" dirty="0" smtClean="0"/>
-              <a:t> (Source: </a:t>
-            </a:r>
-            <a:r>
-              <a:rPr lang="en-US" dirty="0" err="1" smtClean="0">
-                <a:hlinkClick r:id="rId2"/>
-              </a:rPr>
-              <a:t>Lastpass</a:t>
-            </a:r>
-            <a:r>
-              <a:rPr lang="en-US" dirty="0" smtClean="0">
-                <a:hlinkClick r:id="rId2"/>
-              </a:rPr>
-              <a:t> Blog</a:t>
-            </a:r>
-            <a:r>
-              <a:rPr lang="en-US" dirty="0" smtClean="0"/>
-              <a:t>)</a:t>
-            </a:r>
-          </a:p>
-          <a:p>
-            <a:r>
-              <a:rPr lang="en-US" dirty="0" smtClean="0"/>
-              <a:t>A cracked vault is more serious</a:t>
-            </a:r>
-            <a:endParaRPr lang="en-US" dirty="0"/>
-          </a:p>
-        </p:txBody>
-      </p:sp>
-      <p:pic>
-        <p:nvPicPr>
-          <p:cNvPr id="13" name="Picture 12"/>
-          <p:cNvPicPr>
-            <a:picLocks noChangeAspect="1"/>
-          </p:cNvPicPr>
-          <p:nvPr/>
-        </p:nvPicPr>
-        <p:blipFill>
-          <a:blip r:embed="rId3">
-            <a:extLst>
-              <a:ext uri="{28A0092B-C50C-407E-A947-70E740481C1C}">
-                <a14:useLocalDpi xmlns:a14="http://schemas.microsoft.com/office/drawing/2010/main" val="0"/>
-              </a:ext>
-            </a:extLst>
-          </a:blip>
-          <a:stretch>
-            <a:fillRect/>
-          </a:stretch>
-        </p:blipFill>
-        <p:spPr>
-          <a:xfrm>
-            <a:off x="6985449" y="3710673"/>
-            <a:ext cx="2328820" cy="2142190"/>
-          </a:xfrm>
-          <a:prstGeom prst="rect">
-            <a:avLst/>
-          </a:prstGeom>
-        </p:spPr>
-      </p:pic>
-      <p:graphicFrame>
-        <p:nvGraphicFramePr>
-          <p:cNvPr id="14" name="Table 13"/>
-          <p:cNvGraphicFramePr>
-            <a:graphicFrameLocks noGrp="1"/>
-          </p:cNvGraphicFramePr>
-          <p:nvPr>
-            <p:extLst>
-              <p:ext uri="{D42A27DB-BD31-4B8C-83A1-F6EECF244321}">
-                <p14:modId xmlns:p14="http://schemas.microsoft.com/office/powerpoint/2010/main" val="53755296"/>
-              </p:ext>
-            </p:extLst>
-          </p:nvPr>
-        </p:nvGraphicFramePr>
-        <p:xfrm>
-          <a:off x="6199003" y="1459888"/>
-          <a:ext cx="4767491" cy="1097280"/>
-        </p:xfrm>
-        <a:graphic>
-          <a:graphicData uri="http://schemas.openxmlformats.org/drawingml/2006/table">
-            <a:tbl>
-              <a:tblPr firstRow="1" bandRow="1">
-                <a:tableStyleId>{5C22544A-7EE6-4342-B048-85BDC9FD1C3A}</a:tableStyleId>
-              </a:tblPr>
-              <a:tblGrid>
-                <a:gridCol w="1887473"/>
-                <a:gridCol w="1290855"/>
-                <a:gridCol w="1589163"/>
-              </a:tblGrid>
-              <a:tr h="245942">
-                <a:tc>
-                  <a:txBody>
-                    <a:bodyPr/>
-                    <a:lstStyle/>
-                    <a:p>
-                      <a:r>
-                        <a:rPr lang="en-US" sz="1200" dirty="0" smtClean="0"/>
-                        <a:t>Website</a:t>
-                      </a:r>
-                      <a:endParaRPr lang="en-US" sz="1200" dirty="0"/>
-                    </a:p>
-                  </a:txBody>
-                  <a:tcPr/>
-                </a:tc>
-                <a:tc>
-                  <a:txBody>
-                    <a:bodyPr/>
-                    <a:lstStyle/>
-                    <a:p>
-                      <a:r>
-                        <a:rPr lang="en-US" sz="1200" dirty="0" smtClean="0"/>
-                        <a:t>Username</a:t>
-                      </a:r>
-                      <a:endParaRPr lang="en-US" sz="1200" dirty="0"/>
-                    </a:p>
-                  </a:txBody>
-                  <a:tcPr/>
-                </a:tc>
-                <a:tc>
-                  <a:txBody>
-                    <a:bodyPr/>
-                    <a:lstStyle/>
-                    <a:p>
-                      <a:r>
-                        <a:rPr lang="en-US" sz="1200" dirty="0" smtClean="0"/>
-                        <a:t>Password</a:t>
-                      </a:r>
-                      <a:endParaRPr lang="en-US" sz="1200" dirty="0"/>
-                    </a:p>
-                  </a:txBody>
-                  <a:tcPr/>
-                </a:tc>
-              </a:tr>
-              <a:tr h="245942">
-                <a:tc>
-                  <a:txBody>
-                    <a:bodyPr/>
-                    <a:lstStyle/>
-                    <a:p>
-                      <a:r>
-                        <a:rPr lang="en-US" sz="1200" dirty="0" smtClean="0">
-                          <a:hlinkClick r:id="rId4"/>
-                        </a:rPr>
-                        <a:t>www.mybank.com</a:t>
-                      </a:r>
-                      <a:endParaRPr lang="en-US" sz="1200" dirty="0"/>
-                    </a:p>
-                  </a:txBody>
-                  <a:tcPr/>
-                </a:tc>
-                <a:tc>
-                  <a:txBody>
-                    <a:bodyPr/>
-                    <a:lstStyle/>
-                    <a:p>
-                      <a:r>
-                        <a:rPr lang="en-US" sz="1200" dirty="0" smtClean="0"/>
-                        <a:t>Bob</a:t>
-                      </a:r>
-                      <a:endParaRPr lang="en-US" sz="1200" dirty="0"/>
-                    </a:p>
-                  </a:txBody>
-                  <a:tcPr/>
-                </a:tc>
-                <a:tc>
-                  <a:txBody>
-                    <a:bodyPr/>
-                    <a:lstStyle/>
-                    <a:p>
-                      <a:r>
-                        <a:rPr lang="en-US" sz="1200" dirty="0" smtClean="0"/>
-                        <a:t>mustang</a:t>
-                      </a:r>
-                      <a:endParaRPr lang="en-US" sz="1200" dirty="0"/>
-                    </a:p>
-                  </a:txBody>
-                  <a:tcPr/>
-                </a:tc>
-              </a:tr>
-              <a:tr h="245942">
-                <a:tc>
-                  <a:txBody>
-                    <a:bodyPr/>
-                    <a:lstStyle/>
-                    <a:p>
-                      <a:r>
-                        <a:rPr lang="en-US" sz="1200" dirty="0" smtClean="0">
-                          <a:hlinkClick r:id="rId5"/>
-                        </a:rPr>
-                        <a:t>www.fakebook.com</a:t>
-                      </a:r>
-                      <a:endParaRPr lang="en-US" sz="1200" dirty="0"/>
-                    </a:p>
-                  </a:txBody>
-                  <a:tcPr/>
-                </a:tc>
-                <a:tc>
-                  <a:txBody>
-                    <a:bodyPr/>
-                    <a:lstStyle/>
-                    <a:p>
-                      <a:r>
-                        <a:rPr lang="en-US" sz="1200" dirty="0" smtClean="0"/>
-                        <a:t>Bob</a:t>
-                      </a:r>
-                      <a:endParaRPr lang="en-US" sz="1200" dirty="0"/>
-                    </a:p>
-                  </a:txBody>
-                  <a:tcPr/>
-                </a:tc>
-                <a:tc>
-                  <a:txBody>
-                    <a:bodyPr/>
-                    <a:lstStyle/>
-                    <a:p>
-                      <a:r>
-                        <a:rPr lang="en-US" sz="1200" dirty="0" smtClean="0"/>
-                        <a:t>football</a:t>
-                      </a:r>
-                      <a:endParaRPr lang="en-US" sz="1200" dirty="0"/>
-                    </a:p>
-                  </a:txBody>
-                  <a:tcPr/>
-                </a:tc>
-              </a:tr>
-              <a:tr h="245942">
-                <a:tc>
-                  <a:txBody>
-                    <a:bodyPr/>
-                    <a:lstStyle/>
-                    <a:p>
-                      <a:r>
-                        <a:rPr lang="en-US" sz="1200" dirty="0" smtClean="0">
-                          <a:hlinkClick r:id="rId6"/>
-                        </a:rPr>
-                        <a:t>www.yahoo.com</a:t>
-                      </a:r>
-                      <a:endParaRPr lang="en-US" sz="1200" dirty="0"/>
-                    </a:p>
-                  </a:txBody>
-                  <a:tcPr/>
-                </a:tc>
-                <a:tc>
-                  <a:txBody>
-                    <a:bodyPr/>
-                    <a:lstStyle/>
-                    <a:p>
-                      <a:r>
-                        <a:rPr lang="en-US" sz="1200" dirty="0" smtClean="0"/>
-                        <a:t>Bob</a:t>
-                      </a:r>
-                      <a:endParaRPr lang="en-US" sz="1200" dirty="0"/>
-                    </a:p>
-                  </a:txBody>
-                  <a:tcPr/>
-                </a:tc>
-                <a:tc>
-                  <a:txBody>
-                    <a:bodyPr/>
-                    <a:lstStyle/>
-                    <a:p>
-                      <a:r>
-                        <a:rPr lang="en-US" sz="1200" dirty="0" smtClean="0"/>
-                        <a:t>123456789</a:t>
-                      </a:r>
-                      <a:endParaRPr lang="en-US" sz="1200" dirty="0"/>
-                    </a:p>
-                  </a:txBody>
-                  <a:tcPr/>
-                </a:tc>
-              </a:tr>
-            </a:tbl>
-          </a:graphicData>
-        </a:graphic>
-      </p:graphicFrame>
-      <p:sp>
-        <p:nvSpPr>
-          <p:cNvPr id="15" name="Down Arrow 14"/>
-          <p:cNvSpPr/>
-          <p:nvPr/>
-        </p:nvSpPr>
-        <p:spPr>
-          <a:xfrm>
-            <a:off x="7946556" y="2633508"/>
-            <a:ext cx="258555" cy="953567"/>
-          </a:xfrm>
-          <a:prstGeom prst="downArrow">
-            <a:avLst/>
-          </a:prstGeom>
-        </p:spPr>
-        <p:style>
-          <a:lnRef idx="2">
-            <a:schemeClr val="accent1">
-              <a:shade val="50000"/>
-            </a:schemeClr>
-          </a:lnRef>
-          <a:fillRef idx="1">
-            <a:schemeClr val="accent1"/>
-          </a:fillRef>
-          <a:effectRef idx="0">
-            <a:schemeClr val="accent1"/>
-          </a:effectRef>
-          <a:fontRef idx="minor">
-            <a:schemeClr val="lt1"/>
-          </a:fontRef>
-        </p:style>
-        <p:txBody>
-          <a:bodyPr rtlCol="0" anchor="ctr"/>
-          <a:lstStyle/>
-          <a:p>
-            <a:pPr algn="ctr"/>
-            <a:endParaRPr lang="en-US"/>
-          </a:p>
-        </p:txBody>
-      </p:sp>
-      <p:sp>
-        <p:nvSpPr>
-          <p:cNvPr id="16" name="TextBox 15"/>
-          <p:cNvSpPr txBox="1"/>
-          <p:nvPr/>
-        </p:nvSpPr>
-        <p:spPr>
-          <a:xfrm>
-            <a:off x="8582748" y="2787343"/>
-            <a:ext cx="1349528" cy="923330"/>
-          </a:xfrm>
-          <a:prstGeom prst="rect">
-            <a:avLst/>
-          </a:prstGeom>
-          <a:noFill/>
-        </p:spPr>
-        <p:txBody>
-          <a:bodyPr wrap="square" rtlCol="0">
-            <a:spAutoFit/>
-          </a:bodyPr>
-          <a:lstStyle/>
-          <a:p>
-            <a:pPr algn="ctr"/>
-            <a:r>
-              <a:rPr lang="en-US" dirty="0" smtClean="0"/>
-              <a:t>Master Password</a:t>
-            </a:r>
-          </a:p>
-          <a:p>
-            <a:pPr algn="ctr"/>
-            <a:r>
-              <a:rPr lang="en-US" b="1" dirty="0"/>
-              <a:t>P</a:t>
-            </a:r>
-          </a:p>
-        </p:txBody>
-      </p:sp>
-      <p:sp>
-        <p:nvSpPr>
-          <p:cNvPr id="17" name="TextBox 16"/>
-          <p:cNvSpPr txBox="1"/>
-          <p:nvPr/>
-        </p:nvSpPr>
-        <p:spPr>
-          <a:xfrm>
-            <a:off x="6985449" y="5776486"/>
-            <a:ext cx="2814397" cy="646331"/>
-          </a:xfrm>
-          <a:prstGeom prst="rect">
-            <a:avLst/>
-          </a:prstGeom>
-          <a:noFill/>
-        </p:spPr>
-        <p:txBody>
-          <a:bodyPr wrap="square" rtlCol="0">
-            <a:spAutoFit/>
-          </a:bodyPr>
-          <a:lstStyle/>
-          <a:p>
-            <a:pPr algn="ctr"/>
-            <a:r>
-              <a:rPr lang="en-US" dirty="0" smtClean="0"/>
-              <a:t>Encrypted Vault</a:t>
-            </a:r>
-          </a:p>
-          <a:p>
-            <a:pPr algn="ctr"/>
-            <a:r>
-              <a:rPr lang="en-US" dirty="0" smtClean="0"/>
-              <a:t>(</a:t>
-            </a:r>
-            <a:r>
-              <a:rPr lang="en-US" dirty="0" err="1" smtClean="0"/>
-              <a:t>ciphertext</a:t>
-            </a:r>
-            <a:r>
-              <a:rPr lang="en-US" dirty="0" smtClean="0"/>
-              <a:t>)</a:t>
-            </a:r>
-            <a:endParaRPr lang="en-US" dirty="0"/>
-          </a:p>
-        </p:txBody>
-      </p:sp>
-    </p:spTree>
-    <p:extLst>
-      <p:ext uri="{BB962C8B-B14F-4D97-AF65-F5344CB8AC3E}">
-        <p14:creationId xmlns:p14="http://schemas.microsoft.com/office/powerpoint/2010/main" val="937351517"/>
-      </p:ext>
-    </p:extLst>
-  </p:cSld>
-  <p:clrMapOvr>
-    <a:masterClrMapping/>
-  </p:clrMapOvr>
   <p:timing>
     <p:tnLst>
       <p:par>
@@ -8080,7 +7365,7 @@
 </p:sld>
 </file>
 
-<file path=ppt/slides/slide11.xml><?xml version="1.0" encoding="utf-8"?>
+<file path=ppt/slides/slide10.xml><?xml version="1.0" encoding="utf-8"?>
 <p:sld xmlns:a="http://schemas.openxmlformats.org/drawingml/2006/main" xmlns:r="http://schemas.openxmlformats.org/officeDocument/2006/relationships" xmlns:p="http://schemas.openxmlformats.org/presentationml/2006/main">
   <p:cSld>
     <p:spTree>
@@ -9339,6 +8624,44 @@
           </a:p>
         </p:txBody>
       </p:sp>
+      <p:sp>
+        <p:nvSpPr>
+          <p:cNvPr id="11" name="TextBox 10"/>
+          <p:cNvSpPr txBox="1"/>
+          <p:nvPr/>
+        </p:nvSpPr>
+        <p:spPr>
+          <a:xfrm>
+            <a:off x="9560210" y="4400392"/>
+            <a:ext cx="1254935" cy="584775"/>
+          </a:xfrm>
+          <a:prstGeom prst="rect">
+            <a:avLst/>
+          </a:prstGeom>
+          <a:noFill/>
+        </p:spPr>
+        <p:txBody>
+          <a:bodyPr wrap="square" rtlCol="0">
+            <a:spAutoFit/>
+          </a:bodyPr>
+          <a:lstStyle/>
+          <a:p>
+            <a:r>
+              <a:rPr lang="en-US" sz="3200" dirty="0" smtClean="0">
+                <a:latin typeface="Tahoma" panose="020B0604030504040204" pitchFamily="34" charset="0"/>
+                <a:ea typeface="Tahoma" panose="020B0604030504040204" pitchFamily="34" charset="0"/>
+                <a:cs typeface="Tahoma" panose="020B0604030504040204" pitchFamily="34" charset="0"/>
+              </a:rPr>
+              <a:t>???</a:t>
+            </a:r>
+            <a:endParaRPr lang="en-US" dirty="0">
+              <a:latin typeface="Tahoma" panose="020B0604030504040204" pitchFamily="34" charset="0"/>
+              <a:ea typeface="Tahoma" panose="020B0604030504040204" pitchFamily="34" charset="0"/>
+              <a:cs typeface="Tahoma" panose="020B0604030504040204" pitchFamily="34" charset="0"/>
+            </a:endParaRPr>
+          </a:p>
+        </p:txBody>
+      </p:sp>
     </p:spTree>
     <p:extLst>
       <p:ext uri="{BB962C8B-B14F-4D97-AF65-F5344CB8AC3E}">
@@ -9359,7 +8682,7 @@
 </p:sld>
 </file>
 
-<file path=ppt/slides/slide12.xml><?xml version="1.0" encoding="utf-8"?>
+<file path=ppt/slides/slide11.xml><?xml version="1.0" encoding="utf-8"?>
 <p:sld xmlns:a="http://schemas.openxmlformats.org/drawingml/2006/main" xmlns:r="http://schemas.openxmlformats.org/officeDocument/2006/relationships" xmlns:p="http://schemas.openxmlformats.org/presentationml/2006/main">
   <p:cSld>
     <p:spTree>
@@ -9394,6 +8717,10 @@
             <a:r>
               <a:rPr lang="en-US" dirty="0" smtClean="0"/>
               <a:t>Honey Encryption	</a:t>
+            </a:r>
+            <a:r>
+              <a:rPr lang="en-US" baseline="30000" dirty="0" smtClean="0"/>
+              <a:t>[4]</a:t>
             </a:r>
             <a:r>
               <a:rPr lang="en-US" dirty="0"/>
@@ -9684,10 +9011,17 @@
   <p:clrMapOvr>
     <a:masterClrMapping/>
   </p:clrMapOvr>
+  <p:timing>
+    <p:tnLst>
+      <p:par>
+        <p:cTn id="1" dur="indefinite" restart="never" nodeType="tmRoot"/>
+      </p:par>
+    </p:tnLst>
+  </p:timing>
 </p:sld>
 </file>
 
-<file path=ppt/slides/slide13.xml><?xml version="1.0" encoding="utf-8"?>
+<file path=ppt/slides/slide12.xml><?xml version="1.0" encoding="utf-8"?>
 <p:sld xmlns:a="http://schemas.openxmlformats.org/drawingml/2006/main" xmlns:r="http://schemas.openxmlformats.org/officeDocument/2006/relationships" xmlns:p="http://schemas.openxmlformats.org/presentationml/2006/main">
   <p:cSld>
     <p:spTree>
@@ -10449,10 +9783,17 @@
   <p:clrMapOvr>
     <a:masterClrMapping/>
   </p:clrMapOvr>
+  <p:timing>
+    <p:tnLst>
+      <p:par>
+        <p:cTn id="1" dur="indefinite" restart="never" nodeType="tmRoot"/>
+      </p:par>
+    </p:tnLst>
+  </p:timing>
 </p:sld>
 </file>
 
-<file path=ppt/slides/slide14.xml><?xml version="1.0" encoding="utf-8"?>
+<file path=ppt/slides/slide13.xml><?xml version="1.0" encoding="utf-8"?>
 <p:sld xmlns:a="http://schemas.openxmlformats.org/drawingml/2006/main" xmlns:r="http://schemas.openxmlformats.org/officeDocument/2006/relationships" xmlns:p="http://schemas.openxmlformats.org/presentationml/2006/main">
   <p:cSld>
     <p:spTree>
@@ -10961,10 +10302,17 @@
   <p:clrMapOvr>
     <a:masterClrMapping/>
   </p:clrMapOvr>
+  <p:timing>
+    <p:tnLst>
+      <p:par>
+        <p:cTn id="1" dur="indefinite" restart="never" nodeType="tmRoot"/>
+      </p:par>
+    </p:tnLst>
+  </p:timing>
 </p:sld>
 </file>
 
-<file path=ppt/slides/slide15.xml><?xml version="1.0" encoding="utf-8"?>
+<file path=ppt/slides/slide14.xml><?xml version="1.0" encoding="utf-8"?>
 <p:sld xmlns:a="http://schemas.openxmlformats.org/drawingml/2006/main" xmlns:r="http://schemas.openxmlformats.org/officeDocument/2006/relationships" xmlns:p="http://schemas.openxmlformats.org/presentationml/2006/main">
   <p:cSld>
     <p:spTree>
@@ -12206,10 +11554,17 @@
   <p:clrMapOvr>
     <a:masterClrMapping/>
   </p:clrMapOvr>
+  <p:timing>
+    <p:tnLst>
+      <p:par>
+        <p:cTn id="1" dur="indefinite" restart="never" nodeType="tmRoot"/>
+      </p:par>
+    </p:tnLst>
+  </p:timing>
 </p:sld>
 </file>
 
-<file path=ppt/slides/slide16.xml><?xml version="1.0" encoding="utf-8"?>
+<file path=ppt/slides/slide15.xml><?xml version="1.0" encoding="utf-8"?>
 <p:sld xmlns:a="http://schemas.openxmlformats.org/drawingml/2006/main" xmlns:r="http://schemas.openxmlformats.org/officeDocument/2006/relationships" xmlns:p="http://schemas.openxmlformats.org/presentationml/2006/main">
   <p:cSld>
     <p:spTree>
@@ -12299,48 +11654,19 @@
             </a:r>
           </a:p>
           <a:p>
-            <a:r>
-              <a:rPr lang="en-US" dirty="0" smtClean="0"/>
-              <a:t>Encoder – Given M from </a:t>
-            </a:r>
-            <a:r>
-              <a:rPr lang="en-US" dirty="0" smtClean="0">
-                <a:latin typeface="AR BERKLEY" panose="02000000000000000000" pitchFamily="2" charset="0"/>
-              </a:rPr>
-              <a:t>M</a:t>
-            </a:r>
-            <a:r>
-              <a:rPr lang="en-US" dirty="0" smtClean="0"/>
-              <a:t> yield a Seed value S (often binary string)</a:t>
-            </a:r>
-          </a:p>
-          <a:p>
-            <a:r>
-              <a:rPr lang="en-US" dirty="0"/>
-              <a:t>Decoder </a:t>
-            </a:r>
-            <a:r>
-              <a:rPr lang="en-US" dirty="0" smtClean="0"/>
-              <a:t>– Given sampled seed S </a:t>
-            </a:r>
-            <a:r>
-              <a:rPr lang="en-US" dirty="0"/>
-              <a:t>produces a </a:t>
-            </a:r>
-            <a:r>
-              <a:rPr lang="en-US" dirty="0" smtClean="0"/>
-              <a:t>message distributed </a:t>
-            </a:r>
-            <a:r>
-              <a:rPr lang="en-US" dirty="0"/>
-              <a:t>(approximately) under </a:t>
-            </a:r>
-            <a:r>
-              <a:rPr lang="en-US" dirty="0" smtClean="0">
-                <a:latin typeface="AR BERKLEY" panose="02000000000000000000" pitchFamily="2" charset="0"/>
-              </a:rPr>
-              <a:t>M</a:t>
-            </a:r>
+            <a:endParaRPr lang="en-US" dirty="0" smtClean="0">
+              <a:latin typeface="AR BERKLEY" panose="02000000000000000000" pitchFamily="2" charset="0"/>
+            </a:endParaRPr>
+          </a:p>
+          <a:p>
+            <a:endParaRPr lang="en-US" dirty="0">
+              <a:latin typeface="AR BERKLEY" panose="02000000000000000000" pitchFamily="2" charset="0"/>
+            </a:endParaRPr>
+          </a:p>
+          <a:p>
+            <a:endParaRPr lang="en-US" dirty="0" smtClean="0">
+              <a:latin typeface="AR BERKLEY" panose="02000000000000000000" pitchFamily="2" charset="0"/>
+            </a:endParaRPr>
           </a:p>
           <a:p>
             <a:endParaRPr lang="en-US" dirty="0">
@@ -12436,6 +11762,364 @@
           </a:p>
         </p:txBody>
       </p:sp>
+      <p:sp>
+        <p:nvSpPr>
+          <p:cNvPr id="4" name="Rectangle 3"/>
+          <p:cNvSpPr/>
+          <p:nvPr/>
+        </p:nvSpPr>
+        <p:spPr>
+          <a:xfrm>
+            <a:off x="2545190" y="3129103"/>
+            <a:ext cx="1266061" cy="1104363"/>
+          </a:xfrm>
+          <a:prstGeom prst="rect">
+            <a:avLst/>
+          </a:prstGeom>
+        </p:spPr>
+        <p:style>
+          <a:lnRef idx="2">
+            <a:schemeClr val="accent1">
+              <a:shade val="50000"/>
+            </a:schemeClr>
+          </a:lnRef>
+          <a:fillRef idx="1">
+            <a:schemeClr val="accent1"/>
+          </a:fillRef>
+          <a:effectRef idx="0">
+            <a:schemeClr val="accent1"/>
+          </a:effectRef>
+          <a:fontRef idx="minor">
+            <a:schemeClr val="lt1"/>
+          </a:fontRef>
+        </p:style>
+        <p:txBody>
+          <a:bodyPr rtlCol="0" anchor="ctr"/>
+          <a:lstStyle/>
+          <a:p>
+            <a:pPr algn="ctr"/>
+            <a:r>
+              <a:rPr lang="en-US" dirty="0" smtClean="0"/>
+              <a:t>Encoder</a:t>
+            </a:r>
+            <a:endParaRPr lang="en-US" dirty="0"/>
+          </a:p>
+        </p:txBody>
+      </p:sp>
+      <p:sp>
+        <p:nvSpPr>
+          <p:cNvPr id="5" name="TextBox 4"/>
+          <p:cNvSpPr txBox="1"/>
+          <p:nvPr/>
+        </p:nvSpPr>
+        <p:spPr>
+          <a:xfrm>
+            <a:off x="1703310" y="3496618"/>
+            <a:ext cx="384679" cy="369332"/>
+          </a:xfrm>
+          <a:prstGeom prst="rect">
+            <a:avLst/>
+          </a:prstGeom>
+          <a:noFill/>
+        </p:spPr>
+        <p:txBody>
+          <a:bodyPr wrap="square" rtlCol="0">
+            <a:spAutoFit/>
+          </a:bodyPr>
+          <a:lstStyle/>
+          <a:p>
+            <a:r>
+              <a:rPr lang="en-US" dirty="0" smtClean="0"/>
+              <a:t>M</a:t>
+            </a:r>
+            <a:endParaRPr lang="en-US" dirty="0"/>
+          </a:p>
+        </p:txBody>
+      </p:sp>
+      <p:sp>
+        <p:nvSpPr>
+          <p:cNvPr id="6" name="TextBox 5"/>
+          <p:cNvSpPr txBox="1"/>
+          <p:nvPr/>
+        </p:nvSpPr>
+        <p:spPr>
+          <a:xfrm>
+            <a:off x="4268452" y="3496618"/>
+            <a:ext cx="938574" cy="369332"/>
+          </a:xfrm>
+          <a:prstGeom prst="rect">
+            <a:avLst/>
+          </a:prstGeom>
+          <a:noFill/>
+        </p:spPr>
+        <p:txBody>
+          <a:bodyPr wrap="square" rtlCol="0">
+            <a:spAutoFit/>
+          </a:bodyPr>
+          <a:lstStyle/>
+          <a:p>
+            <a:r>
+              <a:rPr lang="en-US" dirty="0" smtClean="0"/>
+              <a:t>S</a:t>
+            </a:r>
+            <a:endParaRPr lang="en-US" dirty="0"/>
+          </a:p>
+        </p:txBody>
+      </p:sp>
+      <p:cxnSp>
+        <p:nvCxnSpPr>
+          <p:cNvPr id="7" name="Straight Arrow Connector 6"/>
+          <p:cNvCxnSpPr>
+            <a:stCxn id="5" idx="3"/>
+            <a:endCxn id="4" idx="1"/>
+          </p:cNvCxnSpPr>
+          <p:nvPr/>
+        </p:nvCxnSpPr>
+        <p:spPr>
+          <a:xfrm>
+            <a:off x="2087989" y="3681284"/>
+            <a:ext cx="457201" cy="1"/>
+          </a:xfrm>
+          <a:prstGeom prst="straightConnector1">
+            <a:avLst/>
+          </a:prstGeom>
+          <a:ln>
+            <a:solidFill>
+              <a:schemeClr val="tx1"/>
+            </a:solidFill>
+            <a:tailEnd type="triangle"/>
+          </a:ln>
+        </p:spPr>
+        <p:style>
+          <a:lnRef idx="3">
+            <a:schemeClr val="dk1"/>
+          </a:lnRef>
+          <a:fillRef idx="0">
+            <a:schemeClr val="dk1"/>
+          </a:fillRef>
+          <a:effectRef idx="2">
+            <a:schemeClr val="dk1"/>
+          </a:effectRef>
+          <a:fontRef idx="minor">
+            <a:schemeClr val="tx1"/>
+          </a:fontRef>
+        </p:style>
+      </p:cxnSp>
+      <p:cxnSp>
+        <p:nvCxnSpPr>
+          <p:cNvPr id="8" name="Straight Arrow Connector 7"/>
+          <p:cNvCxnSpPr/>
+          <p:nvPr/>
+        </p:nvCxnSpPr>
+        <p:spPr>
+          <a:xfrm>
+            <a:off x="3811251" y="3681283"/>
+            <a:ext cx="457201" cy="1"/>
+          </a:xfrm>
+          <a:prstGeom prst="straightConnector1">
+            <a:avLst/>
+          </a:prstGeom>
+          <a:ln>
+            <a:solidFill>
+              <a:schemeClr val="tx1"/>
+            </a:solidFill>
+            <a:tailEnd type="triangle"/>
+          </a:ln>
+        </p:spPr>
+        <p:style>
+          <a:lnRef idx="3">
+            <a:schemeClr val="dk1"/>
+          </a:lnRef>
+          <a:fillRef idx="0">
+            <a:schemeClr val="dk1"/>
+          </a:fillRef>
+          <a:effectRef idx="2">
+            <a:schemeClr val="dk1"/>
+          </a:effectRef>
+          <a:fontRef idx="minor">
+            <a:schemeClr val="tx1"/>
+          </a:fontRef>
+        </p:style>
+      </p:cxnSp>
+      <p:sp>
+        <p:nvSpPr>
+          <p:cNvPr id="9" name="Rectangle 8"/>
+          <p:cNvSpPr/>
+          <p:nvPr/>
+        </p:nvSpPr>
+        <p:spPr>
+          <a:xfrm>
+            <a:off x="7137155" y="3142768"/>
+            <a:ext cx="1266061" cy="1104363"/>
+          </a:xfrm>
+          <a:prstGeom prst="rect">
+            <a:avLst/>
+          </a:prstGeom>
+        </p:spPr>
+        <p:style>
+          <a:lnRef idx="2">
+            <a:schemeClr val="accent1">
+              <a:shade val="50000"/>
+            </a:schemeClr>
+          </a:lnRef>
+          <a:fillRef idx="1">
+            <a:schemeClr val="accent1"/>
+          </a:fillRef>
+          <a:effectRef idx="0">
+            <a:schemeClr val="accent1"/>
+          </a:effectRef>
+          <a:fontRef idx="minor">
+            <a:schemeClr val="lt1"/>
+          </a:fontRef>
+        </p:style>
+        <p:txBody>
+          <a:bodyPr rtlCol="0" anchor="ctr"/>
+          <a:lstStyle/>
+          <a:p>
+            <a:pPr algn="ctr"/>
+            <a:r>
+              <a:rPr lang="en-US" dirty="0" smtClean="0"/>
+              <a:t>Decoder</a:t>
+            </a:r>
+            <a:endParaRPr lang="en-US" dirty="0"/>
+          </a:p>
+        </p:txBody>
+      </p:sp>
+      <p:sp>
+        <p:nvSpPr>
+          <p:cNvPr id="10" name="TextBox 9"/>
+          <p:cNvSpPr txBox="1"/>
+          <p:nvPr/>
+        </p:nvSpPr>
+        <p:spPr>
+          <a:xfrm>
+            <a:off x="6344814" y="3510283"/>
+            <a:ext cx="335140" cy="369332"/>
+          </a:xfrm>
+          <a:prstGeom prst="rect">
+            <a:avLst/>
+          </a:prstGeom>
+          <a:noFill/>
+        </p:spPr>
+        <p:txBody>
+          <a:bodyPr wrap="square" rtlCol="0">
+            <a:spAutoFit/>
+          </a:bodyPr>
+          <a:lstStyle/>
+          <a:p>
+            <a:r>
+              <a:rPr lang="en-US" dirty="0" smtClean="0"/>
+              <a:t>S</a:t>
+            </a:r>
+            <a:endParaRPr lang="en-US" dirty="0"/>
+          </a:p>
+        </p:txBody>
+      </p:sp>
+      <p:sp>
+        <p:nvSpPr>
+          <p:cNvPr id="11" name="TextBox 10"/>
+          <p:cNvSpPr txBox="1"/>
+          <p:nvPr/>
+        </p:nvSpPr>
+        <p:spPr>
+          <a:xfrm>
+            <a:off x="8860417" y="3510283"/>
+            <a:ext cx="397095" cy="369332"/>
+          </a:xfrm>
+          <a:prstGeom prst="rect">
+            <a:avLst/>
+          </a:prstGeom>
+          <a:noFill/>
+        </p:spPr>
+        <p:txBody>
+          <a:bodyPr wrap="square" rtlCol="0">
+            <a:spAutoFit/>
+          </a:bodyPr>
+          <a:lstStyle/>
+          <a:p>
+            <a:r>
+              <a:rPr lang="en-US" dirty="0" smtClean="0"/>
+              <a:t>M</a:t>
+            </a:r>
+            <a:endParaRPr lang="en-US" dirty="0"/>
+          </a:p>
+        </p:txBody>
+      </p:sp>
+      <p:cxnSp>
+        <p:nvCxnSpPr>
+          <p:cNvPr id="12" name="Straight Arrow Connector 11"/>
+          <p:cNvCxnSpPr>
+            <a:stCxn id="10" idx="3"/>
+            <a:endCxn id="9" idx="1"/>
+          </p:cNvCxnSpPr>
+          <p:nvPr/>
+        </p:nvCxnSpPr>
+        <p:spPr>
+          <a:xfrm>
+            <a:off x="6679954" y="3694949"/>
+            <a:ext cx="457201" cy="1"/>
+          </a:xfrm>
+          <a:prstGeom prst="straightConnector1">
+            <a:avLst/>
+          </a:prstGeom>
+          <a:ln>
+            <a:solidFill>
+              <a:schemeClr val="tx1"/>
+            </a:solidFill>
+            <a:tailEnd type="triangle"/>
+          </a:ln>
+        </p:spPr>
+        <p:style>
+          <a:lnRef idx="3">
+            <a:schemeClr val="dk1"/>
+          </a:lnRef>
+          <a:fillRef idx="0">
+            <a:schemeClr val="dk1"/>
+          </a:fillRef>
+          <a:effectRef idx="2">
+            <a:schemeClr val="dk1"/>
+          </a:effectRef>
+          <a:fontRef idx="minor">
+            <a:schemeClr val="tx1"/>
+          </a:fontRef>
+        </p:style>
+      </p:cxnSp>
+      <p:cxnSp>
+        <p:nvCxnSpPr>
+          <p:cNvPr id="13" name="Straight Arrow Connector 12"/>
+          <p:cNvCxnSpPr/>
+          <p:nvPr/>
+        </p:nvCxnSpPr>
+        <p:spPr>
+          <a:xfrm>
+            <a:off x="8403216" y="3694948"/>
+            <a:ext cx="457201" cy="1"/>
+          </a:xfrm>
+          <a:prstGeom prst="straightConnector1">
+            <a:avLst/>
+          </a:prstGeom>
+          <a:ln>
+            <a:solidFill>
+              <a:schemeClr val="tx1"/>
+            </a:solidFill>
+            <a:tailEnd type="triangle"/>
+          </a:ln>
+        </p:spPr>
+        <p:style>
+          <a:lnRef idx="3">
+            <a:schemeClr val="dk1"/>
+          </a:lnRef>
+          <a:fillRef idx="0">
+            <a:schemeClr val="dk1"/>
+          </a:fillRef>
+          <a:effectRef idx="2">
+            <a:schemeClr val="dk1"/>
+          </a:effectRef>
+          <a:fontRef idx="minor">
+            <a:schemeClr val="tx1"/>
+          </a:fontRef>
+        </p:style>
+      </p:cxnSp>
     </p:spTree>
     <p:extLst>
       <p:ext uri="{BB962C8B-B14F-4D97-AF65-F5344CB8AC3E}">
@@ -12446,10 +12130,17 @@
   <p:clrMapOvr>
     <a:masterClrMapping/>
   </p:clrMapOvr>
+  <p:timing>
+    <p:tnLst>
+      <p:par>
+        <p:cTn id="1" dur="indefinite" restart="never" nodeType="tmRoot"/>
+      </p:par>
+    </p:tnLst>
+  </p:timing>
 </p:sld>
 </file>
 
-<file path=ppt/slides/slide17.xml><?xml version="1.0" encoding="utf-8"?>
+<file path=ppt/slides/slide16.xml><?xml version="1.0" encoding="utf-8"?>
 <p:sld xmlns:a="http://schemas.openxmlformats.org/drawingml/2006/main" xmlns:r="http://schemas.openxmlformats.org/officeDocument/2006/relationships" xmlns:p="http://schemas.openxmlformats.org/presentationml/2006/main">
   <p:cSld>
     <p:spTree>
@@ -13684,6 +13375,153 @@
   <p:clrMapOvr>
     <a:masterClrMapping/>
   </p:clrMapOvr>
+  <p:timing>
+    <p:tnLst>
+      <p:par>
+        <p:cTn id="1" dur="indefinite" restart="never" nodeType="tmRoot"/>
+      </p:par>
+    </p:tnLst>
+  </p:timing>
+</p:sld>
+</file>
+
+<file path=ppt/slides/slide17.xml><?xml version="1.0" encoding="utf-8"?>
+<p:sld xmlns:a="http://schemas.openxmlformats.org/drawingml/2006/main" xmlns:r="http://schemas.openxmlformats.org/officeDocument/2006/relationships" xmlns:p="http://schemas.openxmlformats.org/presentationml/2006/main">
+  <p:cSld>
+    <p:spTree>
+      <p:nvGrpSpPr>
+        <p:cNvPr id="1" name=""/>
+        <p:cNvGrpSpPr/>
+        <p:nvPr/>
+      </p:nvGrpSpPr>
+      <p:grpSpPr>
+        <a:xfrm>
+          <a:off x="0" y="0"/>
+          <a:ext cx="0" cy="0"/>
+          <a:chOff x="0" y="0"/>
+          <a:chExt cx="0" cy="0"/>
+        </a:xfrm>
+      </p:grpSpPr>
+      <p:sp>
+        <p:nvSpPr>
+          <p:cNvPr id="2" name="Title 1"/>
+          <p:cNvSpPr>
+            <a:spLocks noGrp="1"/>
+          </p:cNvSpPr>
+          <p:nvPr>
+            <p:ph type="title"/>
+          </p:nvPr>
+        </p:nvSpPr>
+        <p:spPr/>
+        <p:txBody>
+          <a:bodyPr/>
+          <a:lstStyle/>
+          <a:p>
+            <a:r>
+              <a:rPr lang="en-US" dirty="0" smtClean="0"/>
+              <a:t>Message Recovery Game</a:t>
+            </a:r>
+            <a:endParaRPr lang="en-US" dirty="0"/>
+          </a:p>
+        </p:txBody>
+      </p:sp>
+      <p:sp>
+        <p:nvSpPr>
+          <p:cNvPr id="3" name="Content Placeholder 2"/>
+          <p:cNvSpPr>
+            <a:spLocks noGrp="1"/>
+          </p:cNvSpPr>
+          <p:nvPr>
+            <p:ph idx="1"/>
+          </p:nvPr>
+        </p:nvSpPr>
+        <p:spPr/>
+        <p:txBody>
+          <a:bodyPr/>
+          <a:lstStyle/>
+          <a:p>
+            <a:r>
+              <a:rPr lang="en-US" dirty="0" smtClean="0"/>
+              <a:t>Message M is picked from message distribution </a:t>
+            </a:r>
+            <a:r>
+              <a:rPr lang="en-US" dirty="0" smtClean="0">
+                <a:latin typeface="AR BERKLEY" panose="02000000000000000000" pitchFamily="2" charset="0"/>
+              </a:rPr>
+              <a:t>M</a:t>
+            </a:r>
+          </a:p>
+          <a:p>
+            <a:r>
+              <a:rPr lang="en-US" dirty="0" smtClean="0"/>
+              <a:t>Key K is picked from key distribution </a:t>
+            </a:r>
+            <a:r>
+              <a:rPr lang="en-US" dirty="0" smtClean="0">
+                <a:latin typeface="AR BERKLEY" panose="02000000000000000000" pitchFamily="2" charset="0"/>
+              </a:rPr>
+              <a:t>K</a:t>
+            </a:r>
+          </a:p>
+          <a:p>
+            <a:r>
+              <a:rPr lang="en-US" dirty="0" smtClean="0"/>
+              <a:t>M is encrypted under K</a:t>
+            </a:r>
+          </a:p>
+          <a:p>
+            <a:r>
+              <a:rPr lang="en-US" dirty="0" smtClean="0"/>
+              <a:t>Adversary is given C and outputs a guess M’ for message</a:t>
+            </a:r>
+          </a:p>
+          <a:p>
+            <a:pPr lvl="1"/>
+            <a:r>
+              <a:rPr lang="en-US" dirty="0" smtClean="0"/>
+              <a:t>Adversary knows message and key distribution</a:t>
+            </a:r>
+          </a:p>
+          <a:p>
+            <a:r>
+              <a:rPr lang="en-US" dirty="0" smtClean="0"/>
+              <a:t>Adversary Wins if M’ = M</a:t>
+            </a:r>
+          </a:p>
+          <a:p>
+            <a:endParaRPr lang="en-US" dirty="0"/>
+          </a:p>
+          <a:p>
+            <a:r>
+              <a:rPr lang="en-US" dirty="0" smtClean="0"/>
+              <a:t>With regular PBE, unbounded adversary wins 100%</a:t>
+            </a:r>
+          </a:p>
+          <a:p>
+            <a:pPr marL="0" indent="0">
+              <a:buNone/>
+            </a:pPr>
+            <a:endParaRPr lang="en-US" dirty="0"/>
+          </a:p>
+        </p:txBody>
+      </p:sp>
+    </p:spTree>
+    <p:extLst>
+      <p:ext uri="{BB962C8B-B14F-4D97-AF65-F5344CB8AC3E}">
+        <p14:creationId xmlns:p14="http://schemas.microsoft.com/office/powerpoint/2010/main" val="324948616"/>
+      </p:ext>
+    </p:extLst>
+  </p:cSld>
+  <p:clrMapOvr>
+    <a:masterClrMapping/>
+  </p:clrMapOvr>
+  <p:timing>
+    <p:tnLst>
+      <p:par>
+        <p:cTn id="1" dur="indefinite" restart="never" nodeType="tmRoot"/>
+      </p:par>
+    </p:tnLst>
+  </p:timing>
 </p:sld>
 </file>
 
@@ -13706,7 +13544,7 @@
       </p:grpSpPr>
       <p:sp>
         <p:nvSpPr>
-          <p:cNvPr id="2" name="Title 1"/>
+          <p:cNvPr id="25" name="Title 1"/>
           <p:cNvSpPr>
             <a:spLocks noGrp="1"/>
           </p:cNvSpPr>
@@ -13721,122 +13559,12 @@
           <a:p>
             <a:r>
               <a:rPr lang="en-US" dirty="0" smtClean="0"/>
-              <a:t>Message Recovery Game</a:t>
+              <a:t>Example</a:t>
             </a:r>
             <a:endParaRPr lang="en-US" dirty="0"/>
           </a:p>
         </p:txBody>
       </p:sp>
-      <p:sp>
-        <p:nvSpPr>
-          <p:cNvPr id="3" name="Content Placeholder 2"/>
-          <p:cNvSpPr>
-            <a:spLocks noGrp="1"/>
-          </p:cNvSpPr>
-          <p:nvPr>
-            <p:ph idx="1"/>
-          </p:nvPr>
-        </p:nvSpPr>
-        <p:spPr/>
-        <p:txBody>
-          <a:bodyPr/>
-          <a:lstStyle/>
-          <a:p>
-            <a:r>
-              <a:rPr lang="en-US" dirty="0" smtClean="0"/>
-              <a:t>Message M is picked from message distribution </a:t>
-            </a:r>
-            <a:r>
-              <a:rPr lang="en-US" dirty="0" smtClean="0">
-                <a:latin typeface="AR BERKLEY" panose="02000000000000000000" pitchFamily="2" charset="0"/>
-              </a:rPr>
-              <a:t>M</a:t>
-            </a:r>
-          </a:p>
-          <a:p>
-            <a:r>
-              <a:rPr lang="en-US" dirty="0" smtClean="0"/>
-              <a:t>Key K is picked from key distribution </a:t>
-            </a:r>
-            <a:r>
-              <a:rPr lang="en-US" dirty="0" smtClean="0">
-                <a:latin typeface="AR BERKLEY" panose="02000000000000000000" pitchFamily="2" charset="0"/>
-              </a:rPr>
-              <a:t>K</a:t>
-            </a:r>
-          </a:p>
-          <a:p>
-            <a:r>
-              <a:rPr lang="en-US" dirty="0" smtClean="0"/>
-              <a:t>M is encrypted under K</a:t>
-            </a:r>
-          </a:p>
-          <a:p>
-            <a:r>
-              <a:rPr lang="en-US" dirty="0" smtClean="0"/>
-              <a:t>Adversary is given C and outputs a guess M’ for message</a:t>
-            </a:r>
-          </a:p>
-          <a:p>
-            <a:pPr lvl="1"/>
-            <a:r>
-              <a:rPr lang="en-US" dirty="0" smtClean="0"/>
-              <a:t>Adversary knows message and key distribution</a:t>
-            </a:r>
-          </a:p>
-          <a:p>
-            <a:r>
-              <a:rPr lang="en-US" dirty="0" smtClean="0"/>
-              <a:t>Adversary Wins if M’ = M</a:t>
-            </a:r>
-          </a:p>
-          <a:p>
-            <a:endParaRPr lang="en-US" dirty="0"/>
-          </a:p>
-          <a:p>
-            <a:r>
-              <a:rPr lang="en-US" dirty="0" smtClean="0"/>
-              <a:t>With regular PBE, unbounded adversary wins 100%</a:t>
-            </a:r>
-          </a:p>
-          <a:p>
-            <a:pPr marL="0" indent="0">
-              <a:buNone/>
-            </a:pPr>
-            <a:endParaRPr lang="en-US" dirty="0"/>
-          </a:p>
-        </p:txBody>
-      </p:sp>
-    </p:spTree>
-    <p:extLst>
-      <p:ext uri="{BB962C8B-B14F-4D97-AF65-F5344CB8AC3E}">
-        <p14:creationId xmlns:p14="http://schemas.microsoft.com/office/powerpoint/2010/main" val="324948616"/>
-      </p:ext>
-    </p:extLst>
-  </p:cSld>
-  <p:clrMapOvr>
-    <a:masterClrMapping/>
-  </p:clrMapOvr>
-</p:sld>
-</file>
-
-<file path=ppt/slides/slide19.xml><?xml version="1.0" encoding="utf-8"?>
-<p:sld xmlns:a="http://schemas.openxmlformats.org/drawingml/2006/main" xmlns:r="http://schemas.openxmlformats.org/officeDocument/2006/relationships" xmlns:p="http://schemas.openxmlformats.org/presentationml/2006/main">
-  <p:cSld>
-    <p:spTree>
-      <p:nvGrpSpPr>
-        <p:cNvPr id="1" name=""/>
-        <p:cNvGrpSpPr/>
-        <p:nvPr/>
-      </p:nvGrpSpPr>
-      <p:grpSpPr>
-        <a:xfrm>
-          <a:off x="0" y="0"/>
-          <a:ext cx="0" cy="0"/>
-          <a:chOff x="0" y="0"/>
-          <a:chExt cx="0" cy="0"/>
-        </a:xfrm>
-      </p:grpSpPr>
       <p:graphicFrame>
         <p:nvGraphicFramePr>
           <p:cNvPr id="4" name="Content Placeholder 3"/>
@@ -14601,219 +14329,10 @@
           </a:fontRef>
         </p:style>
       </p:cxnSp>
-      <p:sp>
-        <p:nvSpPr>
-          <p:cNvPr id="25" name="Title 1"/>
-          <p:cNvSpPr>
-            <a:spLocks noGrp="1"/>
-          </p:cNvSpPr>
-          <p:nvPr>
-            <p:ph type="title"/>
-          </p:nvPr>
-        </p:nvSpPr>
-        <p:spPr>
-          <a:xfrm>
-            <a:off x="646111" y="452718"/>
-            <a:ext cx="9404723" cy="1400530"/>
-          </a:xfrm>
-        </p:spPr>
-        <p:txBody>
-          <a:bodyPr/>
-          <a:lstStyle/>
-          <a:p>
-            <a:r>
-              <a:rPr lang="en-US" dirty="0" smtClean="0"/>
-              <a:t>Example</a:t>
-            </a:r>
-            <a:endParaRPr lang="en-US" dirty="0"/>
-          </a:p>
-        </p:txBody>
-      </p:sp>
     </p:spTree>
     <p:extLst>
       <p:ext uri="{BB962C8B-B14F-4D97-AF65-F5344CB8AC3E}">
         <p14:creationId xmlns:p14="http://schemas.microsoft.com/office/powerpoint/2010/main" val="1579043398"/>
-      </p:ext>
-    </p:extLst>
-  </p:cSld>
-  <p:clrMapOvr>
-    <a:masterClrMapping/>
-  </p:clrMapOvr>
-</p:sld>
-</file>
-
-<file path=ppt/slides/slide2.xml><?xml version="1.0" encoding="utf-8"?>
-<p:sld xmlns:a="http://schemas.openxmlformats.org/drawingml/2006/main" xmlns:r="http://schemas.openxmlformats.org/officeDocument/2006/relationships" xmlns:p="http://schemas.openxmlformats.org/presentationml/2006/main">
-  <p:cSld>
-    <p:spTree>
-      <p:nvGrpSpPr>
-        <p:cNvPr id="1" name=""/>
-        <p:cNvGrpSpPr/>
-        <p:nvPr/>
-      </p:nvGrpSpPr>
-      <p:grpSpPr>
-        <a:xfrm>
-          <a:off x="0" y="0"/>
-          <a:ext cx="0" cy="0"/>
-          <a:chOff x="0" y="0"/>
-          <a:chExt cx="0" cy="0"/>
-        </a:xfrm>
-      </p:grpSpPr>
-      <p:sp>
-        <p:nvSpPr>
-          <p:cNvPr id="2" name="Title 1"/>
-          <p:cNvSpPr>
-            <a:spLocks noGrp="1"/>
-          </p:cNvSpPr>
-          <p:nvPr>
-            <p:ph type="title"/>
-          </p:nvPr>
-        </p:nvSpPr>
-        <p:spPr/>
-        <p:txBody>
-          <a:bodyPr/>
-          <a:lstStyle/>
-          <a:p>
-            <a:r>
-              <a:rPr lang="en-US" dirty="0" smtClean="0"/>
-              <a:t>Contents</a:t>
-            </a:r>
-            <a:endParaRPr lang="en-US" dirty="0"/>
-          </a:p>
-        </p:txBody>
-      </p:sp>
-      <p:sp>
-        <p:nvSpPr>
-          <p:cNvPr id="3" name="Content Placeholder 2"/>
-          <p:cNvSpPr>
-            <a:spLocks noGrp="1"/>
-          </p:cNvSpPr>
-          <p:nvPr>
-            <p:ph idx="1"/>
-          </p:nvPr>
-        </p:nvSpPr>
-        <p:spPr/>
-        <p:txBody>
-          <a:bodyPr>
-            <a:normAutofit lnSpcReduction="10000"/>
-          </a:bodyPr>
-          <a:lstStyle/>
-          <a:p>
-            <a:pPr marL="457200" indent="-457200">
-              <a:buFont typeface="+mj-lt"/>
-              <a:buAutoNum type="arabicPeriod"/>
-            </a:pPr>
-            <a:r>
-              <a:rPr lang="en-US" dirty="0" smtClean="0"/>
-              <a:t>Authentication Using Passwords and </a:t>
-            </a:r>
-            <a:r>
-              <a:rPr lang="en-US" dirty="0" err="1" smtClean="0"/>
-              <a:t>HoneyWords</a:t>
-            </a:r>
-            <a:endParaRPr lang="en-US" dirty="0" smtClean="0"/>
-          </a:p>
-          <a:p>
-            <a:pPr marL="457200" indent="-457200">
-              <a:buFont typeface="+mj-lt"/>
-              <a:buAutoNum type="arabicPeriod"/>
-            </a:pPr>
-            <a:r>
-              <a:rPr lang="en-US" dirty="0" smtClean="0"/>
-              <a:t>Conventional Password Based Encryption (PBE)</a:t>
-            </a:r>
-          </a:p>
-          <a:p>
-            <a:pPr marL="457200" indent="-457200">
-              <a:buFont typeface="+mj-lt"/>
-              <a:buAutoNum type="arabicPeriod"/>
-            </a:pPr>
-            <a:r>
-              <a:rPr lang="en-US" dirty="0" smtClean="0"/>
-              <a:t>Introduction to Honey Encryption</a:t>
-            </a:r>
-          </a:p>
-          <a:p>
-            <a:pPr marL="457200" indent="-457200">
-              <a:buFont typeface="+mj-lt"/>
-              <a:buAutoNum type="arabicPeriod"/>
-            </a:pPr>
-            <a:r>
-              <a:rPr lang="en-US" dirty="0" smtClean="0"/>
-              <a:t>Framework</a:t>
-            </a:r>
-          </a:p>
-          <a:p>
-            <a:pPr marL="457200" indent="-457200">
-              <a:buFont typeface="+mj-lt"/>
-              <a:buAutoNum type="arabicPeriod"/>
-            </a:pPr>
-            <a:r>
-              <a:rPr lang="en-US" dirty="0" smtClean="0"/>
-              <a:t>Distribution-Transforming Encoder</a:t>
-            </a:r>
-          </a:p>
-          <a:p>
-            <a:pPr marL="457200" indent="-457200">
-              <a:buFont typeface="+mj-lt"/>
-              <a:buAutoNum type="arabicPeriod"/>
-            </a:pPr>
-            <a:r>
-              <a:rPr lang="en-US" dirty="0" smtClean="0"/>
-              <a:t>Implementation</a:t>
-            </a:r>
-          </a:p>
-          <a:p>
-            <a:pPr marL="457200" indent="-457200">
-              <a:buFont typeface="+mj-lt"/>
-              <a:buAutoNum type="arabicPeriod"/>
-            </a:pPr>
-            <a:r>
-              <a:rPr lang="en-US" dirty="0" smtClean="0"/>
-              <a:t>Message Recovery Game</a:t>
-            </a:r>
-          </a:p>
-          <a:p>
-            <a:pPr marL="457200" indent="-457200">
-              <a:buFont typeface="+mj-lt"/>
-              <a:buAutoNum type="arabicPeriod"/>
-            </a:pPr>
-            <a:r>
-              <a:rPr lang="en-US" dirty="0" smtClean="0"/>
-              <a:t>Example</a:t>
-            </a:r>
-          </a:p>
-          <a:p>
-            <a:pPr marL="457200" indent="-457200">
-              <a:buFont typeface="+mj-lt"/>
-              <a:buAutoNum type="arabicPeriod"/>
-            </a:pPr>
-            <a:r>
-              <a:rPr lang="en-US" dirty="0" smtClean="0"/>
-              <a:t>Applications</a:t>
-            </a:r>
-          </a:p>
-          <a:p>
-            <a:pPr marL="0" indent="0">
-              <a:buNone/>
-            </a:pPr>
-            <a:r>
-              <a:rPr lang="en-US" dirty="0" smtClean="0"/>
-              <a:t>	References</a:t>
-            </a:r>
-          </a:p>
-          <a:p>
-            <a:endParaRPr lang="en-US" dirty="0" smtClean="0"/>
-          </a:p>
-          <a:p>
-            <a:endParaRPr lang="en-US" dirty="0"/>
-          </a:p>
-        </p:txBody>
-      </p:sp>
-    </p:spTree>
-    <p:extLst>
-      <p:ext uri="{BB962C8B-B14F-4D97-AF65-F5344CB8AC3E}">
-        <p14:creationId xmlns:p14="http://schemas.microsoft.com/office/powerpoint/2010/main" val="2354213606"/>
       </p:ext>
     </p:extLst>
   </p:cSld>
@@ -14830,7 +14349,7 @@
 </p:sld>
 </file>
 
-<file path=ppt/slides/slide20.xml><?xml version="1.0" encoding="utf-8"?>
+<file path=ppt/slides/slide19.xml><?xml version="1.0" encoding="utf-8"?>
 <p:sld xmlns:a="http://schemas.openxmlformats.org/drawingml/2006/main" xmlns:r="http://schemas.openxmlformats.org/officeDocument/2006/relationships" xmlns:p="http://schemas.openxmlformats.org/presentationml/2006/main">
   <p:cSld>
     <p:spTree>
@@ -15403,10 +14922,205 @@
   <p:clrMapOvr>
     <a:masterClrMapping/>
   </p:clrMapOvr>
+  <p:timing>
+    <p:tnLst>
+      <p:par>
+        <p:cTn id="1" dur="indefinite" restart="never" nodeType="tmRoot"/>
+      </p:par>
+    </p:tnLst>
+  </p:timing>
 </p:sld>
 </file>
 
-<file path=ppt/slides/slide21.xml><?xml version="1.0" encoding="utf-8"?>
+<file path=ppt/slides/slide2.xml><?xml version="1.0" encoding="utf-8"?>
+<p:sld xmlns:a="http://schemas.openxmlformats.org/drawingml/2006/main" xmlns:r="http://schemas.openxmlformats.org/officeDocument/2006/relationships" xmlns:p="http://schemas.openxmlformats.org/presentationml/2006/main">
+  <p:cSld>
+    <p:spTree>
+      <p:nvGrpSpPr>
+        <p:cNvPr id="1" name=""/>
+        <p:cNvGrpSpPr/>
+        <p:nvPr/>
+      </p:nvGrpSpPr>
+      <p:grpSpPr>
+        <a:xfrm>
+          <a:off x="0" y="0"/>
+          <a:ext cx="0" cy="0"/>
+          <a:chOff x="0" y="0"/>
+          <a:chExt cx="0" cy="0"/>
+        </a:xfrm>
+      </p:grpSpPr>
+      <p:sp>
+        <p:nvSpPr>
+          <p:cNvPr id="2" name="Title 1"/>
+          <p:cNvSpPr>
+            <a:spLocks noGrp="1"/>
+          </p:cNvSpPr>
+          <p:nvPr>
+            <p:ph type="title"/>
+          </p:nvPr>
+        </p:nvSpPr>
+        <p:spPr/>
+        <p:txBody>
+          <a:bodyPr/>
+          <a:lstStyle/>
+          <a:p>
+            <a:r>
+              <a:rPr lang="en-US" dirty="0" smtClean="0"/>
+              <a:t>Contents</a:t>
+            </a:r>
+            <a:endParaRPr lang="en-US" dirty="0"/>
+          </a:p>
+        </p:txBody>
+      </p:sp>
+      <p:sp>
+        <p:nvSpPr>
+          <p:cNvPr id="3" name="Content Placeholder 2"/>
+          <p:cNvSpPr>
+            <a:spLocks noGrp="1"/>
+          </p:cNvSpPr>
+          <p:nvPr>
+            <p:ph idx="1"/>
+          </p:nvPr>
+        </p:nvSpPr>
+        <p:spPr/>
+        <p:txBody>
+          <a:bodyPr>
+            <a:normAutofit lnSpcReduction="10000"/>
+          </a:bodyPr>
+          <a:lstStyle/>
+          <a:p>
+            <a:pPr marL="457200" indent="-457200">
+              <a:buFont typeface="+mj-lt"/>
+              <a:buAutoNum type="arabicPeriod"/>
+            </a:pPr>
+            <a:r>
+              <a:rPr lang="en-US" dirty="0" smtClean="0"/>
+              <a:t>Passwords and </a:t>
+            </a:r>
+            <a:r>
+              <a:rPr lang="en-US" dirty="0" err="1" smtClean="0"/>
+              <a:t>HoneyWords</a:t>
+            </a:r>
+            <a:endParaRPr lang="en-US" dirty="0" smtClean="0"/>
+          </a:p>
+          <a:p>
+            <a:pPr marL="457200" indent="-457200">
+              <a:buFont typeface="+mj-lt"/>
+              <a:buAutoNum type="arabicPeriod"/>
+            </a:pPr>
+            <a:r>
+              <a:rPr lang="en-US" dirty="0" smtClean="0"/>
+              <a:t>Conventional Password Based Encryption (PBE)</a:t>
+            </a:r>
+          </a:p>
+          <a:p>
+            <a:pPr marL="457200" indent="-457200">
+              <a:buFont typeface="+mj-lt"/>
+              <a:buAutoNum type="arabicPeriod"/>
+            </a:pPr>
+            <a:r>
+              <a:rPr lang="en-US" dirty="0" smtClean="0"/>
+              <a:t>Introduction to Honey Encryption</a:t>
+            </a:r>
+          </a:p>
+          <a:p>
+            <a:pPr marL="457200" indent="-457200">
+              <a:buFont typeface="+mj-lt"/>
+              <a:buAutoNum type="arabicPeriod"/>
+            </a:pPr>
+            <a:r>
+              <a:rPr lang="en-US" dirty="0" smtClean="0"/>
+              <a:t>Framework</a:t>
+            </a:r>
+          </a:p>
+          <a:p>
+            <a:pPr marL="457200" indent="-457200">
+              <a:buFont typeface="+mj-lt"/>
+              <a:buAutoNum type="arabicPeriod"/>
+            </a:pPr>
+            <a:r>
+              <a:rPr lang="en-US" dirty="0" smtClean="0"/>
+              <a:t>Distribution-Transforming Encoder</a:t>
+            </a:r>
+          </a:p>
+          <a:p>
+            <a:pPr marL="457200" indent="-457200">
+              <a:buFont typeface="+mj-lt"/>
+              <a:buAutoNum type="arabicPeriod"/>
+            </a:pPr>
+            <a:r>
+              <a:rPr lang="en-US" dirty="0" smtClean="0"/>
+              <a:t>Implementation</a:t>
+            </a:r>
+          </a:p>
+          <a:p>
+            <a:pPr marL="457200" indent="-457200">
+              <a:buFont typeface="+mj-lt"/>
+              <a:buAutoNum type="arabicPeriod"/>
+            </a:pPr>
+            <a:r>
+              <a:rPr lang="en-US" dirty="0" smtClean="0"/>
+              <a:t>Message Recovery Game</a:t>
+            </a:r>
+          </a:p>
+          <a:p>
+            <a:pPr marL="457200" indent="-457200">
+              <a:buFont typeface="+mj-lt"/>
+              <a:buAutoNum type="arabicPeriod"/>
+            </a:pPr>
+            <a:r>
+              <a:rPr lang="en-US" dirty="0" smtClean="0"/>
+              <a:t>Example</a:t>
+            </a:r>
+          </a:p>
+          <a:p>
+            <a:pPr marL="457200" indent="-457200">
+              <a:buFont typeface="+mj-lt"/>
+              <a:buAutoNum type="arabicPeriod"/>
+            </a:pPr>
+            <a:r>
+              <a:rPr lang="en-US" dirty="0" smtClean="0"/>
+              <a:t>Applications</a:t>
+            </a:r>
+          </a:p>
+          <a:p>
+            <a:pPr marL="0" indent="0">
+              <a:buNone/>
+            </a:pPr>
+            <a:r>
+              <a:rPr lang="en-US" dirty="0" smtClean="0"/>
+              <a:t>	References</a:t>
+            </a:r>
+          </a:p>
+          <a:p>
+            <a:endParaRPr lang="en-US" dirty="0" smtClean="0"/>
+          </a:p>
+          <a:p>
+            <a:endParaRPr lang="en-US" dirty="0"/>
+          </a:p>
+        </p:txBody>
+      </p:sp>
+    </p:spTree>
+    <p:extLst>
+      <p:ext uri="{BB962C8B-B14F-4D97-AF65-F5344CB8AC3E}">
+        <p14:creationId xmlns:p14="http://schemas.microsoft.com/office/powerpoint/2010/main" val="2354213606"/>
+      </p:ext>
+    </p:extLst>
+  </p:cSld>
+  <p:clrMapOvr>
+    <a:masterClrMapping/>
+  </p:clrMapOvr>
+  <p:timing>
+    <p:tnLst>
+      <p:par>
+        <p:cTn id="1" dur="indefinite" restart="never" nodeType="tmRoot"/>
+      </p:par>
+    </p:tnLst>
+  </p:timing>
+</p:sld>
+</file>
+
+<file path=ppt/slides/slide20.xml><?xml version="1.0" encoding="utf-8"?>
 <p:sld xmlns:a="http://schemas.openxmlformats.org/drawingml/2006/main" xmlns:r="http://schemas.openxmlformats.org/officeDocument/2006/relationships" xmlns:p="http://schemas.openxmlformats.org/presentationml/2006/main">
   <p:cSld>
     <p:spTree>
@@ -15990,10 +15704,17 @@
   <p:clrMapOvr>
     <a:masterClrMapping/>
   </p:clrMapOvr>
+  <p:timing>
+    <p:tnLst>
+      <p:par>
+        <p:cTn id="1" dur="indefinite" restart="never" nodeType="tmRoot"/>
+      </p:par>
+    </p:tnLst>
+  </p:timing>
 </p:sld>
 </file>
 
-<file path=ppt/slides/slide22.xml><?xml version="1.0" encoding="utf-8"?>
+<file path=ppt/slides/slide21.xml><?xml version="1.0" encoding="utf-8"?>
 <p:sld xmlns:a="http://schemas.openxmlformats.org/drawingml/2006/main" xmlns:r="http://schemas.openxmlformats.org/officeDocument/2006/relationships" xmlns:p="http://schemas.openxmlformats.org/presentationml/2006/main">
   <p:cSld>
     <p:spTree>
@@ -16590,11 +16311,18 @@
   <p:clrMapOvr>
     <a:masterClrMapping/>
   </p:clrMapOvr>
+  <p:timing>
+    <p:tnLst>
+      <p:par>
+        <p:cTn id="1" dur="indefinite" restart="never" nodeType="tmRoot"/>
+      </p:par>
+    </p:tnLst>
+  </p:timing>
 </p:sld>
 </file>
 
-<file path=ppt/slides/slide23.xml><?xml version="1.0" encoding="utf-8"?>
-<p:sld xmlns:a="http://schemas.openxmlformats.org/drawingml/2006/main" xmlns:r="http://schemas.openxmlformats.org/officeDocument/2006/relationships" xmlns:p="http://schemas.openxmlformats.org/presentationml/2006/main">
+<file path=ppt/slides/slide22.xml><?xml version="1.0" encoding="utf-8"?>
+<p:sld xmlns:a="http://schemas.openxmlformats.org/drawingml/2006/main" xmlns:r="http://schemas.openxmlformats.org/officeDocument/2006/relationships" xmlns:p="http://schemas.openxmlformats.org/presentationml/2006/main" show="0">
   <p:cSld>
     <p:spTree>
       <p:nvGrpSpPr>
@@ -17073,10 +16801,25 @@
   <p:clrMapOvr>
     <a:masterClrMapping/>
   </p:clrMapOvr>
+  <mc:AlternateContent xmlns:mc="http://schemas.openxmlformats.org/markup-compatibility/2006">
+    <mc:Choice xmlns:p14="http://schemas.microsoft.com/office/powerpoint/2010/main" Requires="p14">
+      <p:transition spd="slow" p14:dur="2000"/>
+    </mc:Choice>
+    <mc:Fallback>
+      <p:transition spd="slow"/>
+    </mc:Fallback>
+  </mc:AlternateContent>
+  <p:timing>
+    <p:tnLst>
+      <p:par>
+        <p:cTn id="1" dur="indefinite" restart="never" nodeType="tmRoot"/>
+      </p:par>
+    </p:tnLst>
+  </p:timing>
 </p:sld>
 </file>
 
-<file path=ppt/slides/slide24.xml><?xml version="1.0" encoding="utf-8"?>
+<file path=ppt/slides/slide23.xml><?xml version="1.0" encoding="utf-8"?>
 <p:sld xmlns:a="http://schemas.openxmlformats.org/drawingml/2006/main" xmlns:r="http://schemas.openxmlformats.org/officeDocument/2006/relationships" xmlns:p="http://schemas.openxmlformats.org/presentationml/2006/main">
   <p:cSld>
     <p:spTree>
@@ -17171,10 +16914,17 @@
   <p:clrMapOvr>
     <a:masterClrMapping/>
   </p:clrMapOvr>
+  <p:timing>
+    <p:tnLst>
+      <p:par>
+        <p:cTn id="1" dur="indefinite" restart="never" nodeType="tmRoot"/>
+      </p:par>
+    </p:tnLst>
+  </p:timing>
 </p:sld>
 </file>
 
-<file path=ppt/slides/slide25.xml><?xml version="1.0" encoding="utf-8"?>
+<file path=ppt/slides/slide24.xml><?xml version="1.0" encoding="utf-8"?>
 <p:sld xmlns:a="http://schemas.openxmlformats.org/drawingml/2006/main" xmlns:r="http://schemas.openxmlformats.org/officeDocument/2006/relationships" xmlns:p="http://schemas.openxmlformats.org/presentationml/2006/main">
   <p:cSld>
     <p:spTree>
@@ -17551,7 +17301,7 @@
           <a:p>
             <a:r>
               <a:rPr lang="en-US" dirty="0" smtClean="0"/>
-              <a:t>Authentication Using Passwords</a:t>
+              <a:t>Passwords</a:t>
             </a:r>
             <a:endParaRPr lang="en-US" dirty="0"/>
           </a:p>
@@ -17581,25 +17331,13 @@
           <a:p>
             <a:r>
               <a:rPr lang="en-US" dirty="0" smtClean="0"/>
-              <a:t>Salted Password Hashing (</a:t>
-            </a:r>
-            <a:r>
-              <a:rPr lang="en-US" dirty="0" err="1" smtClean="0"/>
-              <a:t>ButeForce</a:t>
-            </a:r>
-            <a:r>
-              <a:rPr lang="en-US" dirty="0" smtClean="0"/>
-              <a:t>)</a:t>
-            </a:r>
-          </a:p>
-          <a:p>
-            <a:r>
-              <a:rPr lang="en-US" dirty="0"/>
-              <a:t>RSA Distributed Credential </a:t>
-            </a:r>
-            <a:r>
-              <a:rPr lang="en-US" dirty="0" smtClean="0"/>
-              <a:t>Protection</a:t>
+              <a:t>Salted Password Hashing</a:t>
+            </a:r>
+          </a:p>
+          <a:p>
+            <a:r>
+              <a:rPr lang="en-US" dirty="0" smtClean="0"/>
+              <a:t>RSA Distributed Credential Protection</a:t>
             </a:r>
           </a:p>
           <a:p>
@@ -18116,10 +17854,40 @@
           </a:p>
         </p:txBody>
       </p:sp>
+      <p:sp>
+        <p:nvSpPr>
+          <p:cNvPr id="16" name="TextBox 15"/>
+          <p:cNvSpPr txBox="1"/>
+          <p:nvPr/>
+        </p:nvSpPr>
+        <p:spPr>
+          <a:xfrm>
+            <a:off x="7857533" y="1152983"/>
+            <a:ext cx="3921407" cy="646331"/>
+          </a:xfrm>
+          <a:prstGeom prst="rect">
+            <a:avLst/>
+          </a:prstGeom>
+          <a:noFill/>
+        </p:spPr>
+        <p:txBody>
+          <a:bodyPr wrap="square" rtlCol="0">
+            <a:spAutoFit/>
+          </a:bodyPr>
+          <a:lstStyle/>
+          <a:p>
+            <a:r>
+              <a:rPr lang="en-US" dirty="0" smtClean="0"/>
+              <a:t>Our focus is on Password based encryption schemes.</a:t>
+            </a:r>
+            <a:endParaRPr lang="en-US" dirty="0"/>
+          </a:p>
+        </p:txBody>
+      </p:sp>
     </p:spTree>
     <p:extLst>
       <p:ext uri="{BB962C8B-B14F-4D97-AF65-F5344CB8AC3E}">
-        <p14:creationId xmlns:p14="http://schemas.microsoft.com/office/powerpoint/2010/main" val="4011783684"/>
+        <p14:creationId xmlns:p14="http://schemas.microsoft.com/office/powerpoint/2010/main" val="3241816319"/>
       </p:ext>
     </p:extLst>
   </p:cSld>
@@ -18170,7 +17938,7 @@
           <a:p>
             <a:r>
               <a:rPr lang="en-US" dirty="0" smtClean="0"/>
-              <a:t>Authentication Using Passwords</a:t>
+              <a:t>Passwords</a:t>
             </a:r>
             <a:endParaRPr lang="en-US" dirty="0"/>
           </a:p>
@@ -18189,12 +17957,12 @@
         <p:spPr>
           <a:xfrm>
             <a:off x="1104293" y="1587440"/>
-            <a:ext cx="9546890" cy="2764311"/>
+            <a:ext cx="9546890" cy="4870116"/>
           </a:xfrm>
         </p:spPr>
         <p:txBody>
           <a:bodyPr>
-            <a:normAutofit fontScale="92500" lnSpcReduction="20000"/>
+            <a:normAutofit/>
           </a:bodyPr>
           <a:lstStyle/>
           <a:p>
@@ -18204,9 +17972,23 @@
             </a:r>
           </a:p>
           <a:p>
+            <a:pPr lvl="1"/>
+            <a:r>
+              <a:rPr lang="en-US" dirty="0" smtClean="0"/>
+              <a:t>Brute Force or Dictionary Attacks</a:t>
+            </a:r>
+          </a:p>
+          <a:p>
             <a:r>
               <a:rPr lang="en-US" dirty="0" smtClean="0"/>
               <a:t>RSA Distributed Credential Protection</a:t>
+            </a:r>
+          </a:p>
+          <a:p>
+            <a:pPr lvl="1"/>
+            <a:r>
+              <a:rPr lang="en-US" dirty="0" smtClean="0"/>
+              <a:t>Deployment cost is High</a:t>
             </a:r>
           </a:p>
           <a:p>
@@ -18220,535 +18002,40 @@
             </a:r>
           </a:p>
           <a:p>
-            <a:pPr marL="457200" lvl="1" indent="0">
-              <a:buNone/>
-            </a:pPr>
-            <a:r>
-              <a:rPr lang="en-US" dirty="0" smtClean="0"/>
-              <a:t>Verification Rules</a:t>
-            </a:r>
-          </a:p>
-          <a:p>
-            <a:pPr marL="800100" lvl="1" indent="-342900">
-              <a:buAutoNum type="arabicPeriod"/>
-            </a:pPr>
-            <a:r>
-              <a:rPr lang="en-US" dirty="0" smtClean="0"/>
-              <a:t>If P = Pi , Grant Access</a:t>
-            </a:r>
-          </a:p>
-          <a:p>
-            <a:pPr marL="800100" lvl="1" indent="-342900">
-              <a:buAutoNum type="arabicPeriod"/>
-            </a:pPr>
-            <a:r>
-              <a:rPr lang="en-US" dirty="0" smtClean="0"/>
-              <a:t>If P’ ∉ (P1…</a:t>
-            </a:r>
+            <a:pPr lvl="1"/>
+            <a:r>
+              <a:rPr lang="en-US" dirty="0" smtClean="0"/>
+              <a:t>Little modification needed</a:t>
+            </a:r>
+          </a:p>
+          <a:p>
+            <a:pPr lvl="1"/>
             <a:r>
               <a:rPr lang="en-US" dirty="0" err="1" smtClean="0"/>
-              <a:t>Pn</a:t>
-            </a:r>
-            <a:r>
-              <a:rPr lang="en-US" dirty="0" smtClean="0"/>
-              <a:t>), Reject. Probability of Adversary </a:t>
-            </a:r>
-            <a:br>
-              <a:rPr lang="en-US" dirty="0" smtClean="0"/>
-            </a:br>
-            <a:r>
-              <a:rPr lang="en-US" dirty="0" smtClean="0"/>
-              <a:t>winning same as hashing</a:t>
-            </a:r>
-          </a:p>
-          <a:p>
-            <a:pPr marL="800100" lvl="1" indent="-342900">
-              <a:buAutoNum type="arabicPeriod"/>
-            </a:pPr>
-            <a:r>
-              <a:rPr lang="en-US" dirty="0" smtClean="0"/>
-              <a:t>If P’ ∈ (P1…</a:t>
+              <a:t>Honeychecker</a:t>
+            </a:r>
+            <a:r>
+              <a:rPr lang="en-US" dirty="0" smtClean="0"/>
+              <a:t> can be offline</a:t>
+            </a:r>
+          </a:p>
+          <a:p>
+            <a:pPr lvl="1"/>
+            <a:r>
+              <a:rPr lang="en-US" dirty="0" smtClean="0"/>
+              <a:t>Better or </a:t>
             </a:r>
             <a:r>
               <a:rPr lang="en-US" dirty="0" err="1" smtClean="0"/>
-              <a:t>Pn</a:t>
-            </a:r>
-            <a:r>
-              <a:rPr lang="en-US" dirty="0" smtClean="0"/>
-              <a:t>) but P’ ≠ Pi. Raise an alarm.</a:t>
-            </a:r>
-            <a:endParaRPr lang="en-US" dirty="0"/>
-          </a:p>
-          <a:p>
-            <a:endParaRPr lang="en-US" dirty="0"/>
-          </a:p>
-        </p:txBody>
-      </p:sp>
-      <p:pic>
-        <p:nvPicPr>
-          <p:cNvPr id="6" name="Picture 5"/>
-          <p:cNvPicPr>
-            <a:picLocks noChangeAspect="1"/>
-          </p:cNvPicPr>
-          <p:nvPr/>
-        </p:nvPicPr>
-        <p:blipFill>
-          <a:blip r:embed="rId3">
-            <a:extLst>
-              <a:ext uri="{28A0092B-C50C-407E-A947-70E740481C1C}">
-                <a14:useLocalDpi xmlns:a14="http://schemas.microsoft.com/office/drawing/2010/main" val="0"/>
-              </a:ext>
-            </a:extLst>
-          </a:blip>
-          <a:stretch>
-            <a:fillRect/>
-          </a:stretch>
-        </p:blipFill>
-        <p:spPr>
-          <a:xfrm>
-            <a:off x="7857533" y="1912378"/>
-            <a:ext cx="3921407" cy="4387009"/>
-          </a:xfrm>
-          <a:prstGeom prst="rect">
-            <a:avLst/>
-          </a:prstGeom>
-        </p:spPr>
-      </p:pic>
-      <p:sp>
-        <p:nvSpPr>
-          <p:cNvPr id="7" name="TextBox 6"/>
-          <p:cNvSpPr txBox="1"/>
-          <p:nvPr/>
-        </p:nvSpPr>
-        <p:spPr>
-          <a:xfrm>
-            <a:off x="7756634" y="6439927"/>
-            <a:ext cx="7384569" cy="577081"/>
-          </a:xfrm>
-          <a:prstGeom prst="rect">
-            <a:avLst/>
-          </a:prstGeom>
-          <a:noFill/>
-        </p:spPr>
-        <p:txBody>
-          <a:bodyPr wrap="square" rtlCol="0">
-            <a:spAutoFit/>
-          </a:bodyPr>
-          <a:lstStyle/>
-          <a:p>
-            <a:r>
-              <a:rPr lang="en-US" sz="1050" dirty="0" smtClean="0"/>
-              <a:t>Figure: Implementation of Honey Passwords</a:t>
-            </a:r>
-          </a:p>
-          <a:p>
-            <a:r>
-              <a:rPr lang="en-US" sz="1050" dirty="0" smtClean="0"/>
-              <a:t>Source: http://resources.infosecinstitute.com/honey-encryption/</a:t>
-            </a:r>
-          </a:p>
-          <a:p>
-            <a:endParaRPr lang="en-US" sz="1050" dirty="0"/>
-          </a:p>
-        </p:txBody>
-      </p:sp>
-      <p:pic>
-        <p:nvPicPr>
-          <p:cNvPr id="8" name="Picture 7"/>
-          <p:cNvPicPr>
-            <a:picLocks noChangeAspect="1"/>
-          </p:cNvPicPr>
-          <p:nvPr/>
-        </p:nvPicPr>
-        <p:blipFill>
-          <a:blip r:embed="rId4">
-            <a:extLst>
-              <a:ext uri="{28A0092B-C50C-407E-A947-70E740481C1C}">
-                <a14:useLocalDpi xmlns:a14="http://schemas.microsoft.com/office/drawing/2010/main" val="0"/>
-              </a:ext>
-            </a:extLst>
-          </a:blip>
-          <a:stretch>
-            <a:fillRect/>
-          </a:stretch>
-        </p:blipFill>
-        <p:spPr>
-          <a:xfrm>
-            <a:off x="1368447" y="4636352"/>
-            <a:ext cx="1355273" cy="1355273"/>
-          </a:xfrm>
-          <a:prstGeom prst="rect">
-            <a:avLst/>
-          </a:prstGeom>
-        </p:spPr>
-      </p:pic>
-      <p:sp>
-        <p:nvSpPr>
-          <p:cNvPr id="9" name="Right Arrow 8"/>
-          <p:cNvSpPr/>
-          <p:nvPr/>
-        </p:nvSpPr>
-        <p:spPr>
-          <a:xfrm>
-            <a:off x="2648607" y="5121930"/>
-            <a:ext cx="1015299" cy="192058"/>
-          </a:xfrm>
-          <a:prstGeom prst="rightArrow">
-            <a:avLst/>
-          </a:prstGeom>
-        </p:spPr>
-        <p:style>
-          <a:lnRef idx="2">
-            <a:schemeClr val="accent1">
-              <a:shade val="50000"/>
-            </a:schemeClr>
-          </a:lnRef>
-          <a:fillRef idx="1">
-            <a:schemeClr val="accent1"/>
-          </a:fillRef>
-          <a:effectRef idx="0">
-            <a:schemeClr val="accent1"/>
-          </a:effectRef>
-          <a:fontRef idx="minor">
-            <a:schemeClr val="lt1"/>
-          </a:fontRef>
-        </p:style>
-        <p:txBody>
-          <a:bodyPr rtlCol="0" anchor="ctr"/>
-          <a:lstStyle/>
-          <a:p>
-            <a:pPr algn="ctr"/>
-            <a:endParaRPr lang="en-US"/>
-          </a:p>
-        </p:txBody>
-      </p:sp>
-      <p:sp>
-        <p:nvSpPr>
-          <p:cNvPr id="10" name="TextBox 9"/>
-          <p:cNvSpPr txBox="1"/>
-          <p:nvPr/>
-        </p:nvSpPr>
-        <p:spPr>
-          <a:xfrm>
-            <a:off x="2595004" y="4753060"/>
-            <a:ext cx="1122504" cy="369332"/>
-          </a:xfrm>
-          <a:prstGeom prst="rect">
-            <a:avLst/>
-          </a:prstGeom>
-          <a:noFill/>
-        </p:spPr>
-        <p:txBody>
-          <a:bodyPr wrap="square" rtlCol="0">
-            <a:spAutoFit/>
-          </a:bodyPr>
-          <a:lstStyle/>
-          <a:p>
-            <a:r>
-              <a:rPr lang="en-US" dirty="0" smtClean="0"/>
-              <a:t>(BOB, P)</a:t>
-            </a:r>
-            <a:endParaRPr lang="en-US" dirty="0"/>
-          </a:p>
-        </p:txBody>
-      </p:sp>
-      <p:sp>
-        <p:nvSpPr>
-          <p:cNvPr id="11" name="TextBox 10"/>
-          <p:cNvSpPr txBox="1"/>
-          <p:nvPr/>
-        </p:nvSpPr>
-        <p:spPr>
-          <a:xfrm>
-            <a:off x="3771111" y="4436825"/>
-            <a:ext cx="775664" cy="1754326"/>
-          </a:xfrm>
-          <a:prstGeom prst="rect">
-            <a:avLst/>
-          </a:prstGeom>
-          <a:noFill/>
-        </p:spPr>
-        <p:txBody>
-          <a:bodyPr wrap="square" rtlCol="0">
-            <a:spAutoFit/>
-          </a:bodyPr>
-          <a:lstStyle/>
-          <a:p>
-            <a:r>
-              <a:rPr lang="en-US" dirty="0" smtClean="0"/>
-              <a:t>P1</a:t>
-            </a:r>
-          </a:p>
-          <a:p>
-            <a:r>
-              <a:rPr lang="en-US" dirty="0" smtClean="0"/>
-              <a:t>P2</a:t>
-            </a:r>
-          </a:p>
-          <a:p>
-            <a:r>
-              <a:rPr lang="en-US" dirty="0" smtClean="0"/>
-              <a:t>…</a:t>
-            </a:r>
-          </a:p>
-          <a:p>
-            <a:r>
-              <a:rPr lang="en-US" dirty="0" smtClean="0"/>
-              <a:t>Pi = P</a:t>
-            </a:r>
-          </a:p>
-          <a:p>
-            <a:r>
-              <a:rPr lang="en-US" dirty="0" smtClean="0"/>
-              <a:t>…</a:t>
-            </a:r>
-          </a:p>
-          <a:p>
-            <a:r>
-              <a:rPr lang="en-US" dirty="0" err="1" smtClean="0"/>
-              <a:t>Pn</a:t>
-            </a:r>
-            <a:endParaRPr lang="en-US" dirty="0"/>
-          </a:p>
-        </p:txBody>
-      </p:sp>
-      <p:sp>
-        <p:nvSpPr>
-          <p:cNvPr id="12" name="Rectangle 11"/>
-          <p:cNvSpPr/>
-          <p:nvPr/>
-        </p:nvSpPr>
-        <p:spPr>
-          <a:xfrm>
-            <a:off x="3830458" y="5316860"/>
-            <a:ext cx="296953" cy="287214"/>
-          </a:xfrm>
-          <a:prstGeom prst="rect">
-            <a:avLst/>
-          </a:prstGeom>
-          <a:noFill/>
-          <a:ln>
-            <a:solidFill>
-              <a:srgbClr val="00B050"/>
-            </a:solidFill>
-          </a:ln>
-        </p:spPr>
-        <p:style>
-          <a:lnRef idx="2">
-            <a:schemeClr val="accent1"/>
-          </a:lnRef>
-          <a:fillRef idx="1">
-            <a:schemeClr val="lt1"/>
-          </a:fillRef>
-          <a:effectRef idx="0">
-            <a:schemeClr val="accent1"/>
-          </a:effectRef>
-          <a:fontRef idx="minor">
-            <a:schemeClr val="dk1"/>
-          </a:fontRef>
-        </p:style>
-        <p:txBody>
-          <a:bodyPr rtlCol="0" anchor="ctr"/>
-          <a:lstStyle/>
-          <a:p>
-            <a:pPr algn="ctr"/>
-            <a:endParaRPr lang="en-US"/>
-          </a:p>
-        </p:txBody>
-      </p:sp>
-      <p:sp>
-        <p:nvSpPr>
-          <p:cNvPr id="13" name="Right Arrow 12"/>
-          <p:cNvSpPr/>
-          <p:nvPr/>
-        </p:nvSpPr>
-        <p:spPr>
-          <a:xfrm>
-            <a:off x="4186758" y="5121930"/>
-            <a:ext cx="656409" cy="192058"/>
-          </a:xfrm>
-          <a:prstGeom prst="rightArrow">
-            <a:avLst/>
-          </a:prstGeom>
-        </p:spPr>
-        <p:style>
-          <a:lnRef idx="2">
-            <a:schemeClr val="accent1">
-              <a:shade val="50000"/>
-            </a:schemeClr>
-          </a:lnRef>
-          <a:fillRef idx="1">
-            <a:schemeClr val="accent1"/>
-          </a:fillRef>
-          <a:effectRef idx="0">
-            <a:schemeClr val="accent1"/>
-          </a:effectRef>
-          <a:fontRef idx="minor">
-            <a:schemeClr val="lt1"/>
-          </a:fontRef>
-        </p:style>
-        <p:txBody>
-          <a:bodyPr rtlCol="0" anchor="ctr"/>
-          <a:lstStyle/>
-          <a:p>
-            <a:pPr algn="ctr"/>
-            <a:endParaRPr lang="en-US"/>
-          </a:p>
-        </p:txBody>
-      </p:sp>
-      <p:sp>
-        <p:nvSpPr>
-          <p:cNvPr id="14" name="Rectangle 13"/>
-          <p:cNvSpPr/>
-          <p:nvPr/>
-        </p:nvSpPr>
-        <p:spPr>
-          <a:xfrm>
-            <a:off x="4899358" y="4700850"/>
-            <a:ext cx="1079489" cy="1034218"/>
-          </a:xfrm>
-          <a:prstGeom prst="rect">
-            <a:avLst/>
-          </a:prstGeom>
-          <a:ln/>
-        </p:spPr>
-        <p:style>
-          <a:lnRef idx="2">
-            <a:schemeClr val="accent1">
-              <a:shade val="50000"/>
-            </a:schemeClr>
-          </a:lnRef>
-          <a:fillRef idx="1">
-            <a:schemeClr val="accent1"/>
-          </a:fillRef>
-          <a:effectRef idx="0">
-            <a:schemeClr val="accent1"/>
-          </a:effectRef>
-          <a:fontRef idx="minor">
-            <a:schemeClr val="lt1"/>
-          </a:fontRef>
-        </p:style>
-        <p:txBody>
-          <a:bodyPr rtlCol="0" anchor="ctr"/>
-          <a:lstStyle/>
-          <a:p>
-            <a:pPr algn="ctr"/>
-            <a:r>
-              <a:rPr lang="en-US" sz="1050" dirty="0" smtClean="0"/>
-              <a:t>Honey Checker:</a:t>
-            </a:r>
-          </a:p>
-          <a:p>
-            <a:pPr algn="ctr"/>
-            <a:r>
-              <a:rPr lang="en-US" sz="1050" dirty="0" smtClean="0"/>
-              <a:t>If Index = </a:t>
-            </a:r>
-            <a:r>
-              <a:rPr lang="en-US" sz="1050" dirty="0" err="1" smtClean="0"/>
-              <a:t>i</a:t>
-            </a:r>
-            <a:r>
-              <a:rPr lang="en-US" sz="1050" dirty="0" smtClean="0"/>
-              <a:t>?</a:t>
-            </a:r>
-          </a:p>
-          <a:p>
-            <a:pPr algn="ctr"/>
-            <a:r>
-              <a:rPr lang="en-US" sz="1050" dirty="0" smtClean="0"/>
-              <a:t>Grant Access</a:t>
-            </a:r>
-          </a:p>
-          <a:p>
-            <a:pPr algn="ctr"/>
-            <a:r>
-              <a:rPr lang="en-US" sz="1050" dirty="0" smtClean="0"/>
-              <a:t>Else</a:t>
-            </a:r>
-          </a:p>
-          <a:p>
-            <a:pPr algn="ctr"/>
-            <a:r>
-              <a:rPr lang="en-US" sz="1050" dirty="0" smtClean="0"/>
-              <a:t>Raise Alarm</a:t>
-            </a:r>
-            <a:endParaRPr lang="en-US" sz="1050" dirty="0"/>
-          </a:p>
-        </p:txBody>
-      </p:sp>
-      <p:sp>
-        <p:nvSpPr>
-          <p:cNvPr id="15" name="Rectangle 14"/>
-          <p:cNvSpPr/>
-          <p:nvPr/>
-        </p:nvSpPr>
-        <p:spPr>
-          <a:xfrm>
-            <a:off x="1570246" y="4346266"/>
-            <a:ext cx="4584612" cy="2093661"/>
-          </a:xfrm>
-          <a:prstGeom prst="rect">
-            <a:avLst/>
-          </a:prstGeom>
-          <a:noFill/>
-          <a:ln>
-            <a:solidFill>
-              <a:schemeClr val="tx1"/>
-            </a:solidFill>
-          </a:ln>
-        </p:spPr>
-        <p:style>
-          <a:lnRef idx="2">
-            <a:schemeClr val="accent1">
-              <a:shade val="50000"/>
-            </a:schemeClr>
-          </a:lnRef>
-          <a:fillRef idx="1">
-            <a:schemeClr val="accent1"/>
-          </a:fillRef>
-          <a:effectRef idx="0">
-            <a:schemeClr val="accent1"/>
-          </a:effectRef>
-          <a:fontRef idx="minor">
-            <a:schemeClr val="lt1"/>
-          </a:fontRef>
-        </p:style>
-        <p:txBody>
-          <a:bodyPr rtlCol="0" anchor="ctr"/>
-          <a:lstStyle/>
-          <a:p>
-            <a:pPr algn="ctr"/>
-            <a:endParaRPr lang="en-US"/>
-          </a:p>
-        </p:txBody>
-      </p:sp>
-      <p:sp>
-        <p:nvSpPr>
-          <p:cNvPr id="16" name="TextBox 15"/>
-          <p:cNvSpPr txBox="1"/>
-          <p:nvPr/>
-        </p:nvSpPr>
-        <p:spPr>
-          <a:xfrm>
-            <a:off x="7857533" y="1152983"/>
-            <a:ext cx="3921407" cy="646331"/>
-          </a:xfrm>
-          <a:prstGeom prst="rect">
-            <a:avLst/>
-          </a:prstGeom>
-          <a:noFill/>
-        </p:spPr>
-        <p:txBody>
-          <a:bodyPr wrap="square" rtlCol="0">
-            <a:spAutoFit/>
-          </a:bodyPr>
-          <a:lstStyle/>
-          <a:p>
-            <a:r>
-              <a:rPr lang="en-US" dirty="0" smtClean="0"/>
-              <a:t>Our focus is on Password based encryption schemes.</a:t>
-            </a:r>
+              <a:t>atleast</a:t>
+            </a:r>
+            <a:r>
+              <a:rPr lang="en-US" dirty="0" smtClean="0"/>
+              <a:t> secure as hashing</a:t>
+            </a:r>
+          </a:p>
+          <a:p>
+            <a:pPr lvl="1"/>
             <a:endParaRPr lang="en-US" dirty="0"/>
           </a:p>
         </p:txBody>
@@ -18756,7 +18043,7 @@
     </p:spTree>
     <p:extLst>
       <p:ext uri="{BB962C8B-B14F-4D97-AF65-F5344CB8AC3E}">
-        <p14:creationId xmlns:p14="http://schemas.microsoft.com/office/powerpoint/2010/main" val="3241816319"/>
+        <p14:creationId xmlns:p14="http://schemas.microsoft.com/office/powerpoint/2010/main" val="2656972683"/>
       </p:ext>
     </p:extLst>
   </p:cSld>
@@ -18806,8 +18093,24 @@
           <a:lstStyle/>
           <a:p>
             <a:r>
-              <a:rPr lang="en-US" dirty="0" smtClean="0"/>
-              <a:t>Authentication Using Passwords</a:t>
+              <a:rPr lang="en-US" sz="2800" dirty="0" smtClean="0"/>
+              <a:t>Passwords</a:t>
+            </a:r>
+            <a:r>
+              <a:rPr lang="en-US" sz="3200" dirty="0" smtClean="0"/>
+              <a:t> </a:t>
+            </a:r>
+            <a:r>
+              <a:rPr lang="en-US" sz="4000" dirty="0" smtClean="0"/>
+              <a:t>|</a:t>
+            </a:r>
+            <a:r>
+              <a:rPr lang="en-US" sz="2400" dirty="0" smtClean="0"/>
+              <a:t> </a:t>
+            </a:r>
+            <a:r>
+              <a:rPr lang="en-US" sz="1600" dirty="0" smtClean="0"/>
+              <a:t>Problems with password</a:t>
             </a:r>
             <a:endParaRPr lang="en-US" dirty="0"/>
           </a:p>
@@ -18825,8 +18128,8 @@
         </p:nvSpPr>
         <p:spPr>
           <a:xfrm>
-            <a:off x="1104293" y="1587440"/>
-            <a:ext cx="9546890" cy="4870116"/>
+            <a:off x="1104293" y="1654084"/>
+            <a:ext cx="8946541" cy="4756444"/>
           </a:xfrm>
         </p:spPr>
         <p:txBody>
@@ -18837,74 +18140,107 @@
           <a:p>
             <a:r>
               <a:rPr lang="en-US" dirty="0" smtClean="0"/>
-              <a:t>Salted Password Hashing</a:t>
+              <a:t>Users select weak passwords</a:t>
             </a:r>
           </a:p>
           <a:p>
             <a:pPr lvl="1"/>
             <a:r>
               <a:rPr lang="en-US" dirty="0" smtClean="0"/>
-              <a:t>Brute Force or Dictionary Attacks</a:t>
-            </a:r>
-          </a:p>
-          <a:p>
-            <a:r>
-              <a:rPr lang="en-US" dirty="0" smtClean="0"/>
-              <a:t>RSA Distributed Credential Protection</a:t>
+              <a:t>Passwords hashes can be easily cracked</a:t>
             </a:r>
           </a:p>
           <a:p>
             <a:pPr lvl="1"/>
-            <a:r>
-              <a:rPr lang="en-US" dirty="0" smtClean="0"/>
-              <a:t>Deployment cost is High</a:t>
-            </a:r>
-          </a:p>
-          <a:p>
+            <a:endParaRPr lang="en-US" dirty="0" smtClean="0"/>
+          </a:p>
+          <a:p>
+            <a:r>
+              <a:rPr lang="en-US" dirty="0" smtClean="0"/>
+              <a:t>Weak passwords are bad, not just for authentication but for Password-Based Encryption (PBE)</a:t>
+            </a:r>
+          </a:p>
+          <a:p>
+            <a:pPr lvl="1"/>
+            <a:r>
+              <a:rPr lang="en-US" dirty="0" smtClean="0"/>
+              <a:t>Suppose a message </a:t>
+            </a:r>
+            <a:r>
+              <a:rPr lang="en-US" sz="2000" b="1" i="1" dirty="0" smtClean="0"/>
+              <a:t>m</a:t>
+            </a:r>
+            <a:r>
+              <a:rPr lang="en-US" b="1" i="1" dirty="0" smtClean="0"/>
+              <a:t> </a:t>
+            </a:r>
+            <a:r>
+              <a:rPr lang="en-US" dirty="0" smtClean="0"/>
+              <a:t>is encrypted under a password </a:t>
+            </a:r>
+            <a:r>
+              <a:rPr lang="en-US" sz="2000" b="1" i="1" dirty="0" smtClean="0"/>
+              <a:t>P</a:t>
+            </a:r>
+            <a:r>
+              <a:rPr lang="en-US" dirty="0" smtClean="0"/>
+              <a:t> using PBE as </a:t>
+            </a:r>
             <a:r>
               <a:rPr lang="en-US" dirty="0" err="1" smtClean="0"/>
-              <a:t>HoneyWords</a:t>
-            </a:r>
-            <a:r>
-              <a:rPr lang="en-US" baseline="30000" dirty="0" smtClean="0"/>
-              <a:t>[1]</a:t>
+              <a:t>cipertext</a:t>
+            </a:r>
+            <a:r>
+              <a:rPr lang="en-US" dirty="0" smtClean="0"/>
+              <a:t> </a:t>
+            </a:r>
+            <a:r>
+              <a:rPr lang="en-US" sz="2000" b="1" i="1" dirty="0" smtClean="0"/>
+              <a:t>c</a:t>
+            </a:r>
+            <a:r>
+              <a:rPr lang="en-US" dirty="0" smtClean="0"/>
+              <a:t>.</a:t>
             </a:r>
           </a:p>
           <a:p>
             <a:pPr lvl="1"/>
             <a:r>
-              <a:rPr lang="en-US" dirty="0" smtClean="0"/>
-              <a:t>Little modification needed</a:t>
+              <a:rPr lang="en-US" b="1" dirty="0" smtClean="0"/>
+              <a:t> </a:t>
+            </a:r>
+            <a:r>
+              <a:rPr lang="en-US" dirty="0" smtClean="0"/>
+              <a:t>An Attacker that guesses P can crack c and learn m</a:t>
             </a:r>
           </a:p>
           <a:p>
             <a:pPr lvl="1"/>
             <a:r>
-              <a:rPr lang="en-US" dirty="0" err="1" smtClean="0"/>
-              <a:t>Honeychecker</a:t>
-            </a:r>
-            <a:r>
-              <a:rPr lang="en-US" dirty="0" smtClean="0"/>
-              <a:t> can be offline</a:t>
-            </a:r>
-          </a:p>
-          <a:p>
-            <a:pPr lvl="1"/>
-            <a:r>
-              <a:rPr lang="en-US" dirty="0" smtClean="0"/>
-              <a:t>Better or </a:t>
-            </a:r>
-            <a:r>
-              <a:rPr lang="en-US" dirty="0" err="1" smtClean="0"/>
-              <a:t>atleast</a:t>
-            </a:r>
-            <a:r>
-              <a:rPr lang="en-US" dirty="0" smtClean="0"/>
-              <a:t> secure as hashing</a:t>
-            </a:r>
-          </a:p>
-          <a:p>
-            <a:pPr lvl="1"/>
+              <a:rPr lang="en-US" dirty="0" smtClean="0"/>
+              <a:t>Given weakness of passwords, guessing P is often easy</a:t>
+            </a:r>
+          </a:p>
+          <a:p>
+            <a:pPr marL="57150" indent="0">
+              <a:buNone/>
+            </a:pPr>
+            <a:r>
+              <a:rPr lang="en-US" dirty="0" smtClean="0"/>
+              <a:t>PBE security is limited by Brute-force bound!</a:t>
+            </a:r>
+          </a:p>
+          <a:p>
+            <a:pPr marL="57150" indent="0">
+              <a:buNone/>
+            </a:pPr>
+            <a:r>
+              <a:rPr lang="en-US" dirty="0" smtClean="0"/>
+              <a:t>Existing PBE strengthens passwords by using Salt.</a:t>
+            </a:r>
+          </a:p>
+          <a:p>
+            <a:pPr lvl="2"/>
             <a:endParaRPr lang="en-US" dirty="0"/>
           </a:p>
         </p:txBody>
@@ -18912,7 +18248,7 @@
     </p:spTree>
     <p:extLst>
       <p:ext uri="{BB962C8B-B14F-4D97-AF65-F5344CB8AC3E}">
-        <p14:creationId xmlns:p14="http://schemas.microsoft.com/office/powerpoint/2010/main" val="2656972683"/>
+        <p14:creationId xmlns:p14="http://schemas.microsoft.com/office/powerpoint/2010/main" val="130168612"/>
       </p:ext>
     </p:extLst>
   </p:cSld>
@@ -18930,208 +18266,6 @@
 </file>
 
 <file path=ppt/slides/slide6.xml><?xml version="1.0" encoding="utf-8"?>
-<p:sld xmlns:a="http://schemas.openxmlformats.org/drawingml/2006/main" xmlns:r="http://schemas.openxmlformats.org/officeDocument/2006/relationships" xmlns:p="http://schemas.openxmlformats.org/presentationml/2006/main">
-  <p:cSld>
-    <p:spTree>
-      <p:nvGrpSpPr>
-        <p:cNvPr id="1" name=""/>
-        <p:cNvGrpSpPr/>
-        <p:nvPr/>
-      </p:nvGrpSpPr>
-      <p:grpSpPr>
-        <a:xfrm>
-          <a:off x="0" y="0"/>
-          <a:ext cx="0" cy="0"/>
-          <a:chOff x="0" y="0"/>
-          <a:chExt cx="0" cy="0"/>
-        </a:xfrm>
-      </p:grpSpPr>
-      <p:sp>
-        <p:nvSpPr>
-          <p:cNvPr id="2" name="Title 1"/>
-          <p:cNvSpPr>
-            <a:spLocks noGrp="1"/>
-          </p:cNvSpPr>
-          <p:nvPr>
-            <p:ph type="title"/>
-          </p:nvPr>
-        </p:nvSpPr>
-        <p:spPr/>
-        <p:txBody>
-          <a:bodyPr/>
-          <a:lstStyle/>
-          <a:p>
-            <a:r>
-              <a:rPr lang="en-US" sz="2800" dirty="0"/>
-              <a:t>Authentication Using </a:t>
-            </a:r>
-            <a:r>
-              <a:rPr lang="en-US" sz="2800" dirty="0" smtClean="0"/>
-              <a:t>Passwords</a:t>
-            </a:r>
-            <a:r>
-              <a:rPr lang="en-US" sz="3200" dirty="0" smtClean="0"/>
-              <a:t> </a:t>
-            </a:r>
-            <a:r>
-              <a:rPr lang="en-US" sz="4000" dirty="0" smtClean="0"/>
-              <a:t>|</a:t>
-            </a:r>
-            <a:r>
-              <a:rPr lang="en-US" sz="2400" dirty="0" smtClean="0"/>
-              <a:t> </a:t>
-            </a:r>
-            <a:r>
-              <a:rPr lang="en-US" sz="1600" dirty="0" smtClean="0"/>
-              <a:t>Problems with password</a:t>
-            </a:r>
-            <a:endParaRPr lang="en-US" dirty="0"/>
-          </a:p>
-        </p:txBody>
-      </p:sp>
-      <p:sp>
-        <p:nvSpPr>
-          <p:cNvPr id="3" name="Content Placeholder 2"/>
-          <p:cNvSpPr>
-            <a:spLocks noGrp="1"/>
-          </p:cNvSpPr>
-          <p:nvPr>
-            <p:ph idx="1"/>
-          </p:nvPr>
-        </p:nvSpPr>
-        <p:spPr>
-          <a:xfrm>
-            <a:off x="1104293" y="1654084"/>
-            <a:ext cx="8946541" cy="4756444"/>
-          </a:xfrm>
-        </p:spPr>
-        <p:txBody>
-          <a:bodyPr>
-            <a:normAutofit/>
-          </a:bodyPr>
-          <a:lstStyle/>
-          <a:p>
-            <a:r>
-              <a:rPr lang="en-US" dirty="0" smtClean="0"/>
-              <a:t>Users select weak passwords</a:t>
-            </a:r>
-          </a:p>
-          <a:p>
-            <a:pPr lvl="1"/>
-            <a:r>
-              <a:rPr lang="en-US" dirty="0" smtClean="0"/>
-              <a:t>Passwords hashes can be easily cracked</a:t>
-            </a:r>
-          </a:p>
-          <a:p>
-            <a:pPr lvl="1"/>
-            <a:endParaRPr lang="en-US" dirty="0" smtClean="0"/>
-          </a:p>
-          <a:p>
-            <a:r>
-              <a:rPr lang="en-US" dirty="0" smtClean="0"/>
-              <a:t>Weak passwords are bad, not just for authentication but for Password-Based Encryption (PBE)</a:t>
-            </a:r>
-          </a:p>
-          <a:p>
-            <a:pPr lvl="1"/>
-            <a:r>
-              <a:rPr lang="en-US" dirty="0" smtClean="0"/>
-              <a:t>Suppose a message </a:t>
-            </a:r>
-            <a:r>
-              <a:rPr lang="en-US" sz="2000" b="1" i="1" dirty="0" smtClean="0"/>
-              <a:t>m</a:t>
-            </a:r>
-            <a:r>
-              <a:rPr lang="en-US" b="1" i="1" dirty="0" smtClean="0"/>
-              <a:t> </a:t>
-            </a:r>
-            <a:r>
-              <a:rPr lang="en-US" dirty="0" smtClean="0"/>
-              <a:t>is encrypted under a password </a:t>
-            </a:r>
-            <a:r>
-              <a:rPr lang="en-US" sz="2000" b="1" i="1" dirty="0" smtClean="0"/>
-              <a:t>P</a:t>
-            </a:r>
-            <a:r>
-              <a:rPr lang="en-US" dirty="0" smtClean="0"/>
-              <a:t> using PBE as </a:t>
-            </a:r>
-            <a:r>
-              <a:rPr lang="en-US" dirty="0" err="1" smtClean="0"/>
-              <a:t>cipertext</a:t>
-            </a:r>
-            <a:r>
-              <a:rPr lang="en-US" dirty="0" smtClean="0"/>
-              <a:t> </a:t>
-            </a:r>
-            <a:r>
-              <a:rPr lang="en-US" sz="2000" b="1" i="1" dirty="0" smtClean="0"/>
-              <a:t>c</a:t>
-            </a:r>
-            <a:r>
-              <a:rPr lang="en-US" dirty="0" smtClean="0"/>
-              <a:t>.</a:t>
-            </a:r>
-          </a:p>
-          <a:p>
-            <a:pPr lvl="1"/>
-            <a:r>
-              <a:rPr lang="en-US" b="1" dirty="0" smtClean="0"/>
-              <a:t> </a:t>
-            </a:r>
-            <a:r>
-              <a:rPr lang="en-US" dirty="0" smtClean="0"/>
-              <a:t>An Attacker that guesses P can crack c and learn m</a:t>
-            </a:r>
-          </a:p>
-          <a:p>
-            <a:pPr lvl="1"/>
-            <a:r>
-              <a:rPr lang="en-US" dirty="0" smtClean="0"/>
-              <a:t>Given weakness of passwords, guessing P is often easy</a:t>
-            </a:r>
-          </a:p>
-          <a:p>
-            <a:pPr marL="57150" indent="0">
-              <a:buNone/>
-            </a:pPr>
-            <a:r>
-              <a:rPr lang="en-US" dirty="0" smtClean="0"/>
-              <a:t>PBE security is limited by Brute-force bound!</a:t>
-            </a:r>
-          </a:p>
-          <a:p>
-            <a:pPr marL="57150" indent="0">
-              <a:buNone/>
-            </a:pPr>
-            <a:r>
-              <a:rPr lang="en-US" dirty="0" smtClean="0"/>
-              <a:t>Existing PBE strengthens passwords by using Salt.</a:t>
-            </a:r>
-          </a:p>
-          <a:p>
-            <a:pPr lvl="2"/>
-            <a:endParaRPr lang="en-US" dirty="0"/>
-          </a:p>
-        </p:txBody>
-      </p:sp>
-    </p:spTree>
-    <p:extLst>
-      <p:ext uri="{BB962C8B-B14F-4D97-AF65-F5344CB8AC3E}">
-        <p14:creationId xmlns:p14="http://schemas.microsoft.com/office/powerpoint/2010/main" val="130168612"/>
-      </p:ext>
-    </p:extLst>
-  </p:cSld>
-  <p:clrMapOvr>
-    <a:masterClrMapping/>
-  </p:clrMapOvr>
-</p:sld>
-</file>
-
-<file path=ppt/slides/slide7.xml><?xml version="1.0" encoding="utf-8"?>
 <p:sld xmlns:a="http://schemas.openxmlformats.org/drawingml/2006/main" xmlns:r="http://schemas.openxmlformats.org/officeDocument/2006/relationships" xmlns:p="http://schemas.openxmlformats.org/presentationml/2006/main">
   <p:cSld>
     <p:spTree>
@@ -20866,7 +20000,7 @@
 </p:sld>
 </file>
 
-<file path=ppt/slides/slide8.xml><?xml version="1.0" encoding="utf-8"?>
+<file path=ppt/slides/slide7.xml><?xml version="1.0" encoding="utf-8"?>
 <p:sld xmlns:a="http://schemas.openxmlformats.org/drawingml/2006/main" xmlns:r="http://schemas.openxmlformats.org/officeDocument/2006/relationships" xmlns:p="http://schemas.openxmlformats.org/presentationml/2006/main">
   <p:cSld>
     <p:spTree>
@@ -22024,6 +21158,16 @@
               <a:rPr lang="en-US" dirty="0" err="1" smtClean="0"/>
               <a:t>TruePlaintext</a:t>
             </a:r>
+            <a:endParaRPr lang="en-US" dirty="0" smtClean="0"/>
+          </a:p>
+          <a:p>
+            <a:pPr marL="0" indent="0">
+              <a:buNone/>
+            </a:pPr>
+            <a:r>
+              <a:rPr lang="en-US" dirty="0" smtClean="0"/>
+              <a:t>…</a:t>
+            </a:r>
             <a:endParaRPr lang="en-US" dirty="0"/>
           </a:p>
         </p:txBody>
@@ -22138,7 +21282,7 @@
 </p:sld>
 </file>
 
-<file path=ppt/slides/slide9.xml><?xml version="1.0" encoding="utf-8"?>
+<file path=ppt/slides/slide8.xml><?xml version="1.0" encoding="utf-8"?>
 <p:sld xmlns:a="http://schemas.openxmlformats.org/drawingml/2006/main" xmlns:r="http://schemas.openxmlformats.org/officeDocument/2006/relationships" xmlns:p="http://schemas.openxmlformats.org/presentationml/2006/main">
   <p:cSld>
     <p:spTree>
@@ -22155,6 +21299,37 @@
           <a:chExt cx="0" cy="0"/>
         </a:xfrm>
       </p:grpSpPr>
+      <p:sp>
+        <p:nvSpPr>
+          <p:cNvPr id="4" name="Title 1"/>
+          <p:cNvSpPr>
+            <a:spLocks noGrp="1"/>
+          </p:cNvSpPr>
+          <p:nvPr>
+            <p:ph type="title"/>
+          </p:nvPr>
+        </p:nvSpPr>
+        <p:spPr/>
+        <p:txBody>
+          <a:bodyPr/>
+          <a:lstStyle/>
+          <a:p>
+            <a:r>
+              <a:rPr lang="en-US" sz="3200" dirty="0"/>
+              <a:t>Password Based </a:t>
+            </a:r>
+            <a:r>
+              <a:rPr lang="en-US" sz="3200" dirty="0" smtClean="0"/>
+              <a:t>Encryption | </a:t>
+            </a:r>
+            <a:r>
+              <a:rPr lang="en-US" sz="2000" dirty="0" smtClean="0"/>
+              <a:t>Brute Force Bound</a:t>
+            </a:r>
+            <a:endParaRPr lang="en-US" sz="3200" dirty="0"/>
+          </a:p>
+        </p:txBody>
+      </p:sp>
       <mc:AlternateContent xmlns:mc="http://schemas.openxmlformats.org/markup-compatibility/2006">
         <mc:Choice xmlns:a14="http://schemas.microsoft.com/office/drawing/2010/main" Requires="a14">
           <p:sp>
@@ -22383,9 +21558,46 @@
           </p:sp>
         </mc:Fallback>
       </mc:AlternateContent>
-      <p:sp>
-        <p:nvSpPr>
-          <p:cNvPr id="4" name="Title 1"/>
+    </p:spTree>
+    <p:extLst>
+      <p:ext uri="{BB962C8B-B14F-4D97-AF65-F5344CB8AC3E}">
+        <p14:creationId xmlns:p14="http://schemas.microsoft.com/office/powerpoint/2010/main" val="2415543767"/>
+      </p:ext>
+    </p:extLst>
+  </p:cSld>
+  <p:clrMapOvr>
+    <a:masterClrMapping/>
+  </p:clrMapOvr>
+  <p:timing>
+    <p:tnLst>
+      <p:par>
+        <p:cTn id="1" dur="indefinite" restart="never" nodeType="tmRoot"/>
+      </p:par>
+    </p:tnLst>
+  </p:timing>
+</p:sld>
+</file>
+
+<file path=ppt/slides/slide9.xml><?xml version="1.0" encoding="utf-8"?>
+<p:sld xmlns:a="http://schemas.openxmlformats.org/drawingml/2006/main" xmlns:r="http://schemas.openxmlformats.org/officeDocument/2006/relationships" xmlns:p="http://schemas.openxmlformats.org/presentationml/2006/main">
+  <p:cSld>
+    <p:spTree>
+      <p:nvGrpSpPr>
+        <p:cNvPr id="1" name=""/>
+        <p:cNvGrpSpPr/>
+        <p:nvPr/>
+      </p:nvGrpSpPr>
+      <p:grpSpPr>
+        <a:xfrm>
+          <a:off x="0" y="0"/>
+          <a:ext cx="0" cy="0"/>
+          <a:chOff x="0" y="0"/>
+          <a:chExt cx="0" cy="0"/>
+        </a:xfrm>
+      </p:grpSpPr>
+      <p:sp>
+        <p:nvSpPr>
+          <p:cNvPr id="2" name="Title 1"/>
           <p:cNvSpPr>
             <a:spLocks noGrp="1"/>
           </p:cNvSpPr>
@@ -22408,16 +21620,495 @@
             </a:r>
             <a:r>
               <a:rPr lang="en-US" sz="2000" dirty="0" smtClean="0"/>
-              <a:t>Brute Force Bound</a:t>
+              <a:t>Example</a:t>
             </a:r>
             <a:endParaRPr lang="en-US" sz="3200" dirty="0"/>
+          </a:p>
+        </p:txBody>
+      </p:sp>
+      <p:sp>
+        <p:nvSpPr>
+          <p:cNvPr id="3" name="Content Placeholder 2"/>
+          <p:cNvSpPr>
+            <a:spLocks noGrp="1"/>
+          </p:cNvSpPr>
+          <p:nvPr>
+            <p:ph idx="1"/>
+          </p:nvPr>
+        </p:nvSpPr>
+        <p:spPr>
+          <a:xfrm>
+            <a:off x="1103312" y="1406284"/>
+            <a:ext cx="8946541" cy="4496326"/>
+          </a:xfrm>
+        </p:spPr>
+        <p:txBody>
+          <a:bodyPr>
+            <a:normAutofit/>
+          </a:bodyPr>
+          <a:lstStyle/>
+          <a:p>
+            <a:r>
+              <a:rPr lang="en-US" dirty="0" smtClean="0"/>
+              <a:t>Password Manager</a:t>
+            </a:r>
+          </a:p>
+          <a:p>
+            <a:endParaRPr lang="en-US" dirty="0"/>
+          </a:p>
+          <a:p>
+            <a:pPr lvl="1"/>
+            <a:r>
+              <a:rPr lang="en-US" dirty="0" err="1" smtClean="0"/>
+              <a:t>Lastpass</a:t>
+            </a:r>
+            <a:endParaRPr lang="en-US" dirty="0" smtClean="0"/>
+          </a:p>
+          <a:p>
+            <a:pPr lvl="1"/>
+            <a:r>
+              <a:rPr lang="en-US" dirty="0" err="1" smtClean="0"/>
+              <a:t>Dashlane</a:t>
+            </a:r>
+            <a:endParaRPr lang="en-US" dirty="0" smtClean="0"/>
+          </a:p>
+          <a:p>
+            <a:pPr lvl="1"/>
+            <a:r>
+              <a:rPr lang="en-US" dirty="0" smtClean="0"/>
+              <a:t>More…</a:t>
+            </a:r>
+          </a:p>
+          <a:p>
+            <a:pPr lvl="1"/>
+            <a:endParaRPr lang="en-US" dirty="0"/>
+          </a:p>
+          <a:p>
+            <a:r>
+              <a:rPr lang="en-US" dirty="0" smtClean="0"/>
+              <a:t>User choose Master Password even worse</a:t>
+            </a:r>
+          </a:p>
+          <a:p>
+            <a:r>
+              <a:rPr lang="en-US" dirty="0" smtClean="0"/>
+              <a:t>Vaults are stored in cloud… </a:t>
+            </a:r>
+          </a:p>
+          <a:p>
+            <a:r>
+              <a:rPr lang="en-US" dirty="0" smtClean="0"/>
+              <a:t>There’s already been a breach on</a:t>
+            </a:r>
+            <a:br>
+              <a:rPr lang="en-US" dirty="0" smtClean="0"/>
+            </a:br>
+            <a:r>
+              <a:rPr lang="en-US" dirty="0" err="1" smtClean="0"/>
+              <a:t>Lastpass</a:t>
+            </a:r>
+            <a:r>
+              <a:rPr lang="en-US" dirty="0" smtClean="0"/>
+              <a:t> (Source: </a:t>
+            </a:r>
+            <a:r>
+              <a:rPr lang="en-US" dirty="0" err="1" smtClean="0">
+                <a:hlinkClick r:id="rId2"/>
+              </a:rPr>
+              <a:t>Lastpass</a:t>
+            </a:r>
+            <a:r>
+              <a:rPr lang="en-US" dirty="0" smtClean="0">
+                <a:hlinkClick r:id="rId2"/>
+              </a:rPr>
+              <a:t> Blog</a:t>
+            </a:r>
+            <a:r>
+              <a:rPr lang="en-US" dirty="0" smtClean="0"/>
+              <a:t>)</a:t>
+            </a:r>
+          </a:p>
+          <a:p>
+            <a:r>
+              <a:rPr lang="en-US" dirty="0" smtClean="0"/>
+              <a:t>A cracked vault is more serious</a:t>
+            </a:r>
+            <a:endParaRPr lang="en-US" dirty="0"/>
+          </a:p>
+        </p:txBody>
+      </p:sp>
+      <p:pic>
+        <p:nvPicPr>
+          <p:cNvPr id="13" name="Picture 12"/>
+          <p:cNvPicPr>
+            <a:picLocks noChangeAspect="1"/>
+          </p:cNvPicPr>
+          <p:nvPr/>
+        </p:nvPicPr>
+        <p:blipFill>
+          <a:blip r:embed="rId3">
+            <a:extLst>
+              <a:ext uri="{28A0092B-C50C-407E-A947-70E740481C1C}">
+                <a14:useLocalDpi xmlns:a14="http://schemas.microsoft.com/office/drawing/2010/main" val="0"/>
+              </a:ext>
+            </a:extLst>
+          </a:blip>
+          <a:stretch>
+            <a:fillRect/>
+          </a:stretch>
+        </p:blipFill>
+        <p:spPr>
+          <a:xfrm>
+            <a:off x="6985449" y="3710673"/>
+            <a:ext cx="2328820" cy="2142190"/>
+          </a:xfrm>
+          <a:prstGeom prst="rect">
+            <a:avLst/>
+          </a:prstGeom>
+        </p:spPr>
+      </p:pic>
+      <p:graphicFrame>
+        <p:nvGraphicFramePr>
+          <p:cNvPr id="14" name="Table 13"/>
+          <p:cNvGraphicFramePr>
+            <a:graphicFrameLocks noGrp="1"/>
+          </p:cNvGraphicFramePr>
+          <p:nvPr>
+            <p:extLst>
+              <p:ext uri="{D42A27DB-BD31-4B8C-83A1-F6EECF244321}">
+                <p14:modId xmlns:p14="http://schemas.microsoft.com/office/powerpoint/2010/main" val="53755296"/>
+              </p:ext>
+            </p:extLst>
+          </p:nvPr>
+        </p:nvGraphicFramePr>
+        <p:xfrm>
+          <a:off x="6199003" y="1459888"/>
+          <a:ext cx="4767491" cy="1097280"/>
+        </p:xfrm>
+        <a:graphic>
+          <a:graphicData uri="http://schemas.openxmlformats.org/drawingml/2006/table">
+            <a:tbl>
+              <a:tblPr firstRow="1" bandRow="1">
+                <a:tableStyleId>{5C22544A-7EE6-4342-B048-85BDC9FD1C3A}</a:tableStyleId>
+              </a:tblPr>
+              <a:tblGrid>
+                <a:gridCol w="1887473"/>
+                <a:gridCol w="1290855"/>
+                <a:gridCol w="1589163"/>
+              </a:tblGrid>
+              <a:tr h="245942">
+                <a:tc>
+                  <a:txBody>
+                    <a:bodyPr/>
+                    <a:lstStyle/>
+                    <a:p>
+                      <a:r>
+                        <a:rPr lang="en-US" sz="1200" dirty="0" smtClean="0"/>
+                        <a:t>Website</a:t>
+                      </a:r>
+                      <a:endParaRPr lang="en-US" sz="1200" dirty="0"/>
+                    </a:p>
+                  </a:txBody>
+                  <a:tcPr/>
+                </a:tc>
+                <a:tc>
+                  <a:txBody>
+                    <a:bodyPr/>
+                    <a:lstStyle/>
+                    <a:p>
+                      <a:r>
+                        <a:rPr lang="en-US" sz="1200" dirty="0" smtClean="0"/>
+                        <a:t>Username</a:t>
+                      </a:r>
+                      <a:endParaRPr lang="en-US" sz="1200" dirty="0"/>
+                    </a:p>
+                  </a:txBody>
+                  <a:tcPr/>
+                </a:tc>
+                <a:tc>
+                  <a:txBody>
+                    <a:bodyPr/>
+                    <a:lstStyle/>
+                    <a:p>
+                      <a:r>
+                        <a:rPr lang="en-US" sz="1200" dirty="0" smtClean="0"/>
+                        <a:t>Password</a:t>
+                      </a:r>
+                      <a:endParaRPr lang="en-US" sz="1200" dirty="0"/>
+                    </a:p>
+                  </a:txBody>
+                  <a:tcPr/>
+                </a:tc>
+              </a:tr>
+              <a:tr h="245942">
+                <a:tc>
+                  <a:txBody>
+                    <a:bodyPr/>
+                    <a:lstStyle/>
+                    <a:p>
+                      <a:r>
+                        <a:rPr lang="en-US" sz="1200" dirty="0" smtClean="0">
+                          <a:hlinkClick r:id="rId4"/>
+                        </a:rPr>
+                        <a:t>www.mybank.com</a:t>
+                      </a:r>
+                      <a:endParaRPr lang="en-US" sz="1200" dirty="0"/>
+                    </a:p>
+                  </a:txBody>
+                  <a:tcPr/>
+                </a:tc>
+                <a:tc>
+                  <a:txBody>
+                    <a:bodyPr/>
+                    <a:lstStyle/>
+                    <a:p>
+                      <a:r>
+                        <a:rPr lang="en-US" sz="1200" dirty="0" smtClean="0"/>
+                        <a:t>Bob</a:t>
+                      </a:r>
+                      <a:endParaRPr lang="en-US" sz="1200" dirty="0"/>
+                    </a:p>
+                  </a:txBody>
+                  <a:tcPr/>
+                </a:tc>
+                <a:tc>
+                  <a:txBody>
+                    <a:bodyPr/>
+                    <a:lstStyle/>
+                    <a:p>
+                      <a:r>
+                        <a:rPr lang="en-US" sz="1200" dirty="0" smtClean="0"/>
+                        <a:t>mustang</a:t>
+                      </a:r>
+                      <a:endParaRPr lang="en-US" sz="1200" dirty="0"/>
+                    </a:p>
+                  </a:txBody>
+                  <a:tcPr/>
+                </a:tc>
+              </a:tr>
+              <a:tr h="245942">
+                <a:tc>
+                  <a:txBody>
+                    <a:bodyPr/>
+                    <a:lstStyle/>
+                    <a:p>
+                      <a:r>
+                        <a:rPr lang="en-US" sz="1200" dirty="0" smtClean="0">
+                          <a:hlinkClick r:id="rId5"/>
+                        </a:rPr>
+                        <a:t>www.fakebook.com</a:t>
+                      </a:r>
+                      <a:endParaRPr lang="en-US" sz="1200" dirty="0"/>
+                    </a:p>
+                  </a:txBody>
+                  <a:tcPr/>
+                </a:tc>
+                <a:tc>
+                  <a:txBody>
+                    <a:bodyPr/>
+                    <a:lstStyle/>
+                    <a:p>
+                      <a:r>
+                        <a:rPr lang="en-US" sz="1200" dirty="0" smtClean="0"/>
+                        <a:t>Bob</a:t>
+                      </a:r>
+                      <a:endParaRPr lang="en-US" sz="1200" dirty="0"/>
+                    </a:p>
+                  </a:txBody>
+                  <a:tcPr/>
+                </a:tc>
+                <a:tc>
+                  <a:txBody>
+                    <a:bodyPr/>
+                    <a:lstStyle/>
+                    <a:p>
+                      <a:r>
+                        <a:rPr lang="en-US" sz="1200" dirty="0" smtClean="0"/>
+                        <a:t>football</a:t>
+                      </a:r>
+                      <a:endParaRPr lang="en-US" sz="1200" dirty="0"/>
+                    </a:p>
+                  </a:txBody>
+                  <a:tcPr/>
+                </a:tc>
+              </a:tr>
+              <a:tr h="245942">
+                <a:tc>
+                  <a:txBody>
+                    <a:bodyPr/>
+                    <a:lstStyle/>
+                    <a:p>
+                      <a:r>
+                        <a:rPr lang="en-US" sz="1200" dirty="0" smtClean="0">
+                          <a:hlinkClick r:id="rId6"/>
+                        </a:rPr>
+                        <a:t>www.yahoo.com</a:t>
+                      </a:r>
+                      <a:endParaRPr lang="en-US" sz="1200" dirty="0"/>
+                    </a:p>
+                  </a:txBody>
+                  <a:tcPr/>
+                </a:tc>
+                <a:tc>
+                  <a:txBody>
+                    <a:bodyPr/>
+                    <a:lstStyle/>
+                    <a:p>
+                      <a:r>
+                        <a:rPr lang="en-US" sz="1200" dirty="0" smtClean="0"/>
+                        <a:t>Bob</a:t>
+                      </a:r>
+                      <a:endParaRPr lang="en-US" sz="1200" dirty="0"/>
+                    </a:p>
+                  </a:txBody>
+                  <a:tcPr/>
+                </a:tc>
+                <a:tc>
+                  <a:txBody>
+                    <a:bodyPr/>
+                    <a:lstStyle/>
+                    <a:p>
+                      <a:r>
+                        <a:rPr lang="en-US" sz="1200" dirty="0" smtClean="0"/>
+                        <a:t>123456789</a:t>
+                      </a:r>
+                      <a:endParaRPr lang="en-US" sz="1200" dirty="0"/>
+                    </a:p>
+                  </a:txBody>
+                  <a:tcPr/>
+                </a:tc>
+              </a:tr>
+            </a:tbl>
+          </a:graphicData>
+        </a:graphic>
+      </p:graphicFrame>
+      <p:sp>
+        <p:nvSpPr>
+          <p:cNvPr id="15" name="Down Arrow 14"/>
+          <p:cNvSpPr/>
+          <p:nvPr/>
+        </p:nvSpPr>
+        <p:spPr>
+          <a:xfrm>
+            <a:off x="7946556" y="2633508"/>
+            <a:ext cx="258555" cy="953567"/>
+          </a:xfrm>
+          <a:prstGeom prst="downArrow">
+            <a:avLst/>
+          </a:prstGeom>
+        </p:spPr>
+        <p:style>
+          <a:lnRef idx="2">
+            <a:schemeClr val="accent1">
+              <a:shade val="50000"/>
+            </a:schemeClr>
+          </a:lnRef>
+          <a:fillRef idx="1">
+            <a:schemeClr val="accent1"/>
+          </a:fillRef>
+          <a:effectRef idx="0">
+            <a:schemeClr val="accent1"/>
+          </a:effectRef>
+          <a:fontRef idx="minor">
+            <a:schemeClr val="lt1"/>
+          </a:fontRef>
+        </p:style>
+        <p:txBody>
+          <a:bodyPr rtlCol="0" anchor="ctr"/>
+          <a:lstStyle/>
+          <a:p>
+            <a:pPr algn="ctr"/>
+            <a:endParaRPr lang="en-US"/>
+          </a:p>
+        </p:txBody>
+      </p:sp>
+      <p:sp>
+        <p:nvSpPr>
+          <p:cNvPr id="16" name="TextBox 15"/>
+          <p:cNvSpPr txBox="1"/>
+          <p:nvPr/>
+        </p:nvSpPr>
+        <p:spPr>
+          <a:xfrm>
+            <a:off x="8582748" y="2787343"/>
+            <a:ext cx="1349528" cy="923330"/>
+          </a:xfrm>
+          <a:prstGeom prst="rect">
+            <a:avLst/>
+          </a:prstGeom>
+          <a:noFill/>
+        </p:spPr>
+        <p:txBody>
+          <a:bodyPr wrap="square" rtlCol="0">
+            <a:spAutoFit/>
+          </a:bodyPr>
+          <a:lstStyle/>
+          <a:p>
+            <a:pPr algn="ctr"/>
+            <a:r>
+              <a:rPr lang="en-US" dirty="0" smtClean="0"/>
+              <a:t>Master Password</a:t>
+            </a:r>
+          </a:p>
+          <a:p>
+            <a:pPr algn="ctr"/>
+            <a:r>
+              <a:rPr lang="en-US" b="1" dirty="0"/>
+              <a:t>P</a:t>
+            </a:r>
+          </a:p>
+        </p:txBody>
+      </p:sp>
+      <p:sp>
+        <p:nvSpPr>
+          <p:cNvPr id="17" name="TextBox 16"/>
+          <p:cNvSpPr txBox="1"/>
+          <p:nvPr/>
+        </p:nvSpPr>
+        <p:spPr>
+          <a:xfrm>
+            <a:off x="6985449" y="5776486"/>
+            <a:ext cx="2814397" cy="646331"/>
+          </a:xfrm>
+          <a:prstGeom prst="rect">
+            <a:avLst/>
+          </a:prstGeom>
+          <a:noFill/>
+        </p:spPr>
+        <p:txBody>
+          <a:bodyPr wrap="square" rtlCol="0">
+            <a:spAutoFit/>
+          </a:bodyPr>
+          <a:lstStyle/>
+          <a:p>
+            <a:pPr algn="ctr"/>
+            <a:r>
+              <a:rPr lang="en-US" dirty="0" smtClean="0"/>
+              <a:t>Encrypted Vault</a:t>
+            </a:r>
+          </a:p>
+          <a:p>
+            <a:pPr algn="ctr"/>
+            <a:r>
+              <a:rPr lang="en-US" dirty="0" smtClean="0"/>
+              <a:t>(</a:t>
+            </a:r>
+            <a:r>
+              <a:rPr lang="en-US" dirty="0" err="1" smtClean="0"/>
+              <a:t>ciphertext</a:t>
+            </a:r>
+            <a:r>
+              <a:rPr lang="en-US" dirty="0" smtClean="0"/>
+              <a:t>)</a:t>
+            </a:r>
+            <a:endParaRPr lang="en-US" dirty="0"/>
           </a:p>
         </p:txBody>
       </p:sp>
     </p:spTree>
     <p:extLst>
       <p:ext uri="{BB962C8B-B14F-4D97-AF65-F5344CB8AC3E}">
-        <p14:creationId xmlns:p14="http://schemas.microsoft.com/office/powerpoint/2010/main" val="2415543767"/>
+        <p14:creationId xmlns:p14="http://schemas.microsoft.com/office/powerpoint/2010/main" val="937351517"/>
       </p:ext>
     </p:extLst>
   </p:cSld>

</xml_diff>